<commit_message>
Ajustes finais no repositorio
</commit_message>
<xml_diff>
--- a/ACS/AC5/LucasKurata_AC5.pptx
+++ b/ACS/AC5/LucasKurata_AC5.pptx
@@ -140,7 +140,7 @@
           <p:cNvPr id="2" name="Título 1">
             <a:extLst>
               <a:ext uri="{FF2B5EF4-FFF2-40B4-BE49-F238E27FC236}">
-                <a16:creationId xmlns:a16="http://schemas.microsoft.com/office/drawing/2014/main" xmlns="" id="{A3FA386C-FC2C-4F91-8EDD-329DDFB952ED}"/>
+                <a16:creationId xmlns="" xmlns:a16="http://schemas.microsoft.com/office/drawing/2014/main" id="{A3FA386C-FC2C-4F91-8EDD-329DDFB952ED}"/>
               </a:ext>
             </a:extLst>
           </p:cNvPr>
@@ -177,7 +177,7 @@
           <p:cNvPr id="3" name="Subtítulo 2">
             <a:extLst>
               <a:ext uri="{FF2B5EF4-FFF2-40B4-BE49-F238E27FC236}">
-                <a16:creationId xmlns:a16="http://schemas.microsoft.com/office/drawing/2014/main" xmlns="" id="{88334717-0707-4671-9E53-CA8F312ECBE2}"/>
+                <a16:creationId xmlns="" xmlns:a16="http://schemas.microsoft.com/office/drawing/2014/main" id="{88334717-0707-4671-9E53-CA8F312ECBE2}"/>
               </a:ext>
             </a:extLst>
           </p:cNvPr>
@@ -247,7 +247,7 @@
           <p:cNvPr id="4" name="Espaço Reservado para Data 3">
             <a:extLst>
               <a:ext uri="{FF2B5EF4-FFF2-40B4-BE49-F238E27FC236}">
-                <a16:creationId xmlns:a16="http://schemas.microsoft.com/office/drawing/2014/main" xmlns="" id="{CF361180-04D4-425A-AA1E-0C6CC32E4166}"/>
+                <a16:creationId xmlns="" xmlns:a16="http://schemas.microsoft.com/office/drawing/2014/main" id="{CF361180-04D4-425A-AA1E-0C6CC32E4166}"/>
               </a:ext>
             </a:extLst>
           </p:cNvPr>
@@ -265,7 +265,7 @@
           <a:p>
             <a:fld id="{3E91D812-1C9C-49AD-BEC0-7CCA4CF1B6CD}" type="datetimeFigureOut">
               <a:rPr lang="pt-BR" smtClean="0"/>
-              <a:t>13/05/2019</a:t>
+              <a:t>16/05/2019</a:t>
             </a:fld>
             <a:endParaRPr lang="pt-BR"/>
           </a:p>
@@ -276,7 +276,7 @@
           <p:cNvPr id="5" name="Espaço Reservado para Rodapé 4">
             <a:extLst>
               <a:ext uri="{FF2B5EF4-FFF2-40B4-BE49-F238E27FC236}">
-                <a16:creationId xmlns:a16="http://schemas.microsoft.com/office/drawing/2014/main" xmlns="" id="{9E5D2A2F-66DB-44BB-A434-3F8FA4870BBC}"/>
+                <a16:creationId xmlns="" xmlns:a16="http://schemas.microsoft.com/office/drawing/2014/main" id="{9E5D2A2F-66DB-44BB-A434-3F8FA4870BBC}"/>
               </a:ext>
             </a:extLst>
           </p:cNvPr>
@@ -301,7 +301,7 @@
           <p:cNvPr id="6" name="Espaço Reservado para Número de Slide 5">
             <a:extLst>
               <a:ext uri="{FF2B5EF4-FFF2-40B4-BE49-F238E27FC236}">
-                <a16:creationId xmlns:a16="http://schemas.microsoft.com/office/drawing/2014/main" xmlns="" id="{1597F922-6C87-42F1-9968-49603B048569}"/>
+                <a16:creationId xmlns="" xmlns:a16="http://schemas.microsoft.com/office/drawing/2014/main" id="{1597F922-6C87-42F1-9968-49603B048569}"/>
               </a:ext>
             </a:extLst>
           </p:cNvPr>
@@ -360,7 +360,7 @@
           <p:cNvPr id="2" name="Título 1">
             <a:extLst>
               <a:ext uri="{FF2B5EF4-FFF2-40B4-BE49-F238E27FC236}">
-                <a16:creationId xmlns:a16="http://schemas.microsoft.com/office/drawing/2014/main" xmlns="" id="{DD0F393C-C789-4212-A5C6-D8DB6BFF53A0}"/>
+                <a16:creationId xmlns="" xmlns:a16="http://schemas.microsoft.com/office/drawing/2014/main" id="{DD0F393C-C789-4212-A5C6-D8DB6BFF53A0}"/>
               </a:ext>
             </a:extLst>
           </p:cNvPr>
@@ -388,7 +388,7 @@
           <p:cNvPr id="3" name="Espaço Reservado para Texto Vertical 2">
             <a:extLst>
               <a:ext uri="{FF2B5EF4-FFF2-40B4-BE49-F238E27FC236}">
-                <a16:creationId xmlns:a16="http://schemas.microsoft.com/office/drawing/2014/main" xmlns="" id="{42A59C34-51B3-4756-87AF-3217C54F5D3D}"/>
+                <a16:creationId xmlns="" xmlns:a16="http://schemas.microsoft.com/office/drawing/2014/main" id="{42A59C34-51B3-4756-87AF-3217C54F5D3D}"/>
               </a:ext>
             </a:extLst>
           </p:cNvPr>
@@ -445,7 +445,7 @@
           <p:cNvPr id="4" name="Espaço Reservado para Data 3">
             <a:extLst>
               <a:ext uri="{FF2B5EF4-FFF2-40B4-BE49-F238E27FC236}">
-                <a16:creationId xmlns:a16="http://schemas.microsoft.com/office/drawing/2014/main" xmlns="" id="{0DCD7C2E-CD26-46F7-AB44-71F874C645CA}"/>
+                <a16:creationId xmlns="" xmlns:a16="http://schemas.microsoft.com/office/drawing/2014/main" id="{0DCD7C2E-CD26-46F7-AB44-71F874C645CA}"/>
               </a:ext>
             </a:extLst>
           </p:cNvPr>
@@ -463,7 +463,7 @@
           <a:p>
             <a:fld id="{3E91D812-1C9C-49AD-BEC0-7CCA4CF1B6CD}" type="datetimeFigureOut">
               <a:rPr lang="pt-BR" smtClean="0"/>
-              <a:t>13/05/2019</a:t>
+              <a:t>16/05/2019</a:t>
             </a:fld>
             <a:endParaRPr lang="pt-BR"/>
           </a:p>
@@ -474,7 +474,7 @@
           <p:cNvPr id="5" name="Espaço Reservado para Rodapé 4">
             <a:extLst>
               <a:ext uri="{FF2B5EF4-FFF2-40B4-BE49-F238E27FC236}">
-                <a16:creationId xmlns:a16="http://schemas.microsoft.com/office/drawing/2014/main" xmlns="" id="{6B799F0C-0377-4E71-BE6C-C38FE6849EF3}"/>
+                <a16:creationId xmlns="" xmlns:a16="http://schemas.microsoft.com/office/drawing/2014/main" id="{6B799F0C-0377-4E71-BE6C-C38FE6849EF3}"/>
               </a:ext>
             </a:extLst>
           </p:cNvPr>
@@ -499,7 +499,7 @@
           <p:cNvPr id="6" name="Espaço Reservado para Número de Slide 5">
             <a:extLst>
               <a:ext uri="{FF2B5EF4-FFF2-40B4-BE49-F238E27FC236}">
-                <a16:creationId xmlns:a16="http://schemas.microsoft.com/office/drawing/2014/main" xmlns="" id="{D2CD5EFF-85C8-475F-9877-E069D843C437}"/>
+                <a16:creationId xmlns="" xmlns:a16="http://schemas.microsoft.com/office/drawing/2014/main" id="{D2CD5EFF-85C8-475F-9877-E069D843C437}"/>
               </a:ext>
             </a:extLst>
           </p:cNvPr>
@@ -558,7 +558,7 @@
           <p:cNvPr id="2" name="Título Vertical 1">
             <a:extLst>
               <a:ext uri="{FF2B5EF4-FFF2-40B4-BE49-F238E27FC236}">
-                <a16:creationId xmlns:a16="http://schemas.microsoft.com/office/drawing/2014/main" xmlns="" id="{41C49E24-32C7-4697-BED4-9F6843D789A8}"/>
+                <a16:creationId xmlns="" xmlns:a16="http://schemas.microsoft.com/office/drawing/2014/main" id="{41C49E24-32C7-4697-BED4-9F6843D789A8}"/>
               </a:ext>
             </a:extLst>
           </p:cNvPr>
@@ -591,7 +591,7 @@
           <p:cNvPr id="3" name="Espaço Reservado para Texto Vertical 2">
             <a:extLst>
               <a:ext uri="{FF2B5EF4-FFF2-40B4-BE49-F238E27FC236}">
-                <a16:creationId xmlns:a16="http://schemas.microsoft.com/office/drawing/2014/main" xmlns="" id="{872B211D-6B0E-4323-800F-98CF713C0A8A}"/>
+                <a16:creationId xmlns="" xmlns:a16="http://schemas.microsoft.com/office/drawing/2014/main" id="{872B211D-6B0E-4323-800F-98CF713C0A8A}"/>
               </a:ext>
             </a:extLst>
           </p:cNvPr>
@@ -653,7 +653,7 @@
           <p:cNvPr id="4" name="Espaço Reservado para Data 3">
             <a:extLst>
               <a:ext uri="{FF2B5EF4-FFF2-40B4-BE49-F238E27FC236}">
-                <a16:creationId xmlns:a16="http://schemas.microsoft.com/office/drawing/2014/main" xmlns="" id="{919FC4CF-4B3C-4501-B1FA-601DF2074195}"/>
+                <a16:creationId xmlns="" xmlns:a16="http://schemas.microsoft.com/office/drawing/2014/main" id="{919FC4CF-4B3C-4501-B1FA-601DF2074195}"/>
               </a:ext>
             </a:extLst>
           </p:cNvPr>
@@ -671,7 +671,7 @@
           <a:p>
             <a:fld id="{3E91D812-1C9C-49AD-BEC0-7CCA4CF1B6CD}" type="datetimeFigureOut">
               <a:rPr lang="pt-BR" smtClean="0"/>
-              <a:t>13/05/2019</a:t>
+              <a:t>16/05/2019</a:t>
             </a:fld>
             <a:endParaRPr lang="pt-BR"/>
           </a:p>
@@ -682,7 +682,7 @@
           <p:cNvPr id="5" name="Espaço Reservado para Rodapé 4">
             <a:extLst>
               <a:ext uri="{FF2B5EF4-FFF2-40B4-BE49-F238E27FC236}">
-                <a16:creationId xmlns:a16="http://schemas.microsoft.com/office/drawing/2014/main" xmlns="" id="{E7E84B59-1BE2-40E5-A53A-8F4A019CDF02}"/>
+                <a16:creationId xmlns="" xmlns:a16="http://schemas.microsoft.com/office/drawing/2014/main" id="{E7E84B59-1BE2-40E5-A53A-8F4A019CDF02}"/>
               </a:ext>
             </a:extLst>
           </p:cNvPr>
@@ -707,7 +707,7 @@
           <p:cNvPr id="6" name="Espaço Reservado para Número de Slide 5">
             <a:extLst>
               <a:ext uri="{FF2B5EF4-FFF2-40B4-BE49-F238E27FC236}">
-                <a16:creationId xmlns:a16="http://schemas.microsoft.com/office/drawing/2014/main" xmlns="" id="{659556BA-7E2A-4355-A4D0-941FDC399882}"/>
+                <a16:creationId xmlns="" xmlns:a16="http://schemas.microsoft.com/office/drawing/2014/main" id="{659556BA-7E2A-4355-A4D0-941FDC399882}"/>
               </a:ext>
             </a:extLst>
           </p:cNvPr>
@@ -766,7 +766,7 @@
           <p:cNvPr id="2" name="Título 1">
             <a:extLst>
               <a:ext uri="{FF2B5EF4-FFF2-40B4-BE49-F238E27FC236}">
-                <a16:creationId xmlns:a16="http://schemas.microsoft.com/office/drawing/2014/main" xmlns="" id="{06D47412-5BFC-4445-817D-756889866BAC}"/>
+                <a16:creationId xmlns="" xmlns:a16="http://schemas.microsoft.com/office/drawing/2014/main" id="{06D47412-5BFC-4445-817D-756889866BAC}"/>
               </a:ext>
             </a:extLst>
           </p:cNvPr>
@@ -794,7 +794,7 @@
           <p:cNvPr id="3" name="Espaço Reservado para Conteúdo 2">
             <a:extLst>
               <a:ext uri="{FF2B5EF4-FFF2-40B4-BE49-F238E27FC236}">
-                <a16:creationId xmlns:a16="http://schemas.microsoft.com/office/drawing/2014/main" xmlns="" id="{9B1EA361-3043-48FA-A976-50610F902D01}"/>
+                <a16:creationId xmlns="" xmlns:a16="http://schemas.microsoft.com/office/drawing/2014/main" id="{9B1EA361-3043-48FA-A976-50610F902D01}"/>
               </a:ext>
             </a:extLst>
           </p:cNvPr>
@@ -851,7 +851,7 @@
           <p:cNvPr id="4" name="Espaço Reservado para Data 3">
             <a:extLst>
               <a:ext uri="{FF2B5EF4-FFF2-40B4-BE49-F238E27FC236}">
-                <a16:creationId xmlns:a16="http://schemas.microsoft.com/office/drawing/2014/main" xmlns="" id="{F3A37D03-3B16-49F4-912E-4DB23F09F45A}"/>
+                <a16:creationId xmlns="" xmlns:a16="http://schemas.microsoft.com/office/drawing/2014/main" id="{F3A37D03-3B16-49F4-912E-4DB23F09F45A}"/>
               </a:ext>
             </a:extLst>
           </p:cNvPr>
@@ -869,7 +869,7 @@
           <a:p>
             <a:fld id="{3E91D812-1C9C-49AD-BEC0-7CCA4CF1B6CD}" type="datetimeFigureOut">
               <a:rPr lang="pt-BR" smtClean="0"/>
-              <a:t>13/05/2019</a:t>
+              <a:t>16/05/2019</a:t>
             </a:fld>
             <a:endParaRPr lang="pt-BR"/>
           </a:p>
@@ -880,7 +880,7 @@
           <p:cNvPr id="5" name="Espaço Reservado para Rodapé 4">
             <a:extLst>
               <a:ext uri="{FF2B5EF4-FFF2-40B4-BE49-F238E27FC236}">
-                <a16:creationId xmlns:a16="http://schemas.microsoft.com/office/drawing/2014/main" xmlns="" id="{B9E0AB52-F869-411D-9E02-B8676C1A1114}"/>
+                <a16:creationId xmlns="" xmlns:a16="http://schemas.microsoft.com/office/drawing/2014/main" id="{B9E0AB52-F869-411D-9E02-B8676C1A1114}"/>
               </a:ext>
             </a:extLst>
           </p:cNvPr>
@@ -905,7 +905,7 @@
           <p:cNvPr id="6" name="Espaço Reservado para Número de Slide 5">
             <a:extLst>
               <a:ext uri="{FF2B5EF4-FFF2-40B4-BE49-F238E27FC236}">
-                <a16:creationId xmlns:a16="http://schemas.microsoft.com/office/drawing/2014/main" xmlns="" id="{4D01CB17-ECE2-4C3E-8E1F-F9979387AD35}"/>
+                <a16:creationId xmlns="" xmlns:a16="http://schemas.microsoft.com/office/drawing/2014/main" id="{4D01CB17-ECE2-4C3E-8E1F-F9979387AD35}"/>
               </a:ext>
             </a:extLst>
           </p:cNvPr>
@@ -964,7 +964,7 @@
           <p:cNvPr id="2" name="Título 1">
             <a:extLst>
               <a:ext uri="{FF2B5EF4-FFF2-40B4-BE49-F238E27FC236}">
-                <a16:creationId xmlns:a16="http://schemas.microsoft.com/office/drawing/2014/main" xmlns="" id="{D8C6A54B-196E-4888-BD13-8C0CCDB425CC}"/>
+                <a16:creationId xmlns="" xmlns:a16="http://schemas.microsoft.com/office/drawing/2014/main" id="{D8C6A54B-196E-4888-BD13-8C0CCDB425CC}"/>
               </a:ext>
             </a:extLst>
           </p:cNvPr>
@@ -1001,7 +1001,7 @@
           <p:cNvPr id="3" name="Espaço Reservado para Texto 2">
             <a:extLst>
               <a:ext uri="{FF2B5EF4-FFF2-40B4-BE49-F238E27FC236}">
-                <a16:creationId xmlns:a16="http://schemas.microsoft.com/office/drawing/2014/main" xmlns="" id="{F7E9788F-4A31-4635-B629-F6DA3C1AEF9E}"/>
+                <a16:creationId xmlns="" xmlns:a16="http://schemas.microsoft.com/office/drawing/2014/main" id="{F7E9788F-4A31-4635-B629-F6DA3C1AEF9E}"/>
               </a:ext>
             </a:extLst>
           </p:cNvPr>
@@ -1126,7 +1126,7 @@
           <p:cNvPr id="4" name="Espaço Reservado para Data 3">
             <a:extLst>
               <a:ext uri="{FF2B5EF4-FFF2-40B4-BE49-F238E27FC236}">
-                <a16:creationId xmlns:a16="http://schemas.microsoft.com/office/drawing/2014/main" xmlns="" id="{A2D3C766-D32A-41B9-B861-33B0C80580EB}"/>
+                <a16:creationId xmlns="" xmlns:a16="http://schemas.microsoft.com/office/drawing/2014/main" id="{A2D3C766-D32A-41B9-B861-33B0C80580EB}"/>
               </a:ext>
             </a:extLst>
           </p:cNvPr>
@@ -1144,7 +1144,7 @@
           <a:p>
             <a:fld id="{3E91D812-1C9C-49AD-BEC0-7CCA4CF1B6CD}" type="datetimeFigureOut">
               <a:rPr lang="pt-BR" smtClean="0"/>
-              <a:t>13/05/2019</a:t>
+              <a:t>16/05/2019</a:t>
             </a:fld>
             <a:endParaRPr lang="pt-BR"/>
           </a:p>
@@ -1155,7 +1155,7 @@
           <p:cNvPr id="5" name="Espaço Reservado para Rodapé 4">
             <a:extLst>
               <a:ext uri="{FF2B5EF4-FFF2-40B4-BE49-F238E27FC236}">
-                <a16:creationId xmlns:a16="http://schemas.microsoft.com/office/drawing/2014/main" xmlns="" id="{6BE45E65-65DC-46E0-8C9E-BCD986E17E8D}"/>
+                <a16:creationId xmlns="" xmlns:a16="http://schemas.microsoft.com/office/drawing/2014/main" id="{6BE45E65-65DC-46E0-8C9E-BCD986E17E8D}"/>
               </a:ext>
             </a:extLst>
           </p:cNvPr>
@@ -1180,7 +1180,7 @@
           <p:cNvPr id="6" name="Espaço Reservado para Número de Slide 5">
             <a:extLst>
               <a:ext uri="{FF2B5EF4-FFF2-40B4-BE49-F238E27FC236}">
-                <a16:creationId xmlns:a16="http://schemas.microsoft.com/office/drawing/2014/main" xmlns="" id="{B0BB2C9E-DDD5-481A-99A8-FBC3C3248267}"/>
+                <a16:creationId xmlns="" xmlns:a16="http://schemas.microsoft.com/office/drawing/2014/main" id="{B0BB2C9E-DDD5-481A-99A8-FBC3C3248267}"/>
               </a:ext>
             </a:extLst>
           </p:cNvPr>
@@ -1239,7 +1239,7 @@
           <p:cNvPr id="2" name="Título 1">
             <a:extLst>
               <a:ext uri="{FF2B5EF4-FFF2-40B4-BE49-F238E27FC236}">
-                <a16:creationId xmlns:a16="http://schemas.microsoft.com/office/drawing/2014/main" xmlns="" id="{9F635F1B-99A4-4AA6-809A-04F117FE0F85}"/>
+                <a16:creationId xmlns="" xmlns:a16="http://schemas.microsoft.com/office/drawing/2014/main" id="{9F635F1B-99A4-4AA6-809A-04F117FE0F85}"/>
               </a:ext>
             </a:extLst>
           </p:cNvPr>
@@ -1267,7 +1267,7 @@
           <p:cNvPr id="3" name="Espaço Reservado para Conteúdo 2">
             <a:extLst>
               <a:ext uri="{FF2B5EF4-FFF2-40B4-BE49-F238E27FC236}">
-                <a16:creationId xmlns:a16="http://schemas.microsoft.com/office/drawing/2014/main" xmlns="" id="{00870D55-C2C1-4214-81CF-D55188287C00}"/>
+                <a16:creationId xmlns="" xmlns:a16="http://schemas.microsoft.com/office/drawing/2014/main" id="{00870D55-C2C1-4214-81CF-D55188287C00}"/>
               </a:ext>
             </a:extLst>
           </p:cNvPr>
@@ -1329,7 +1329,7 @@
           <p:cNvPr id="4" name="Espaço Reservado para Conteúdo 3">
             <a:extLst>
               <a:ext uri="{FF2B5EF4-FFF2-40B4-BE49-F238E27FC236}">
-                <a16:creationId xmlns:a16="http://schemas.microsoft.com/office/drawing/2014/main" xmlns="" id="{1C85CA82-2F6C-4771-81A5-39E45BFF2D3F}"/>
+                <a16:creationId xmlns="" xmlns:a16="http://schemas.microsoft.com/office/drawing/2014/main" id="{1C85CA82-2F6C-4771-81A5-39E45BFF2D3F}"/>
               </a:ext>
             </a:extLst>
           </p:cNvPr>
@@ -1391,7 +1391,7 @@
           <p:cNvPr id="5" name="Espaço Reservado para Data 4">
             <a:extLst>
               <a:ext uri="{FF2B5EF4-FFF2-40B4-BE49-F238E27FC236}">
-                <a16:creationId xmlns:a16="http://schemas.microsoft.com/office/drawing/2014/main" xmlns="" id="{A75A1F48-CED4-4ABD-BD3D-0E8DB82115CB}"/>
+                <a16:creationId xmlns="" xmlns:a16="http://schemas.microsoft.com/office/drawing/2014/main" id="{A75A1F48-CED4-4ABD-BD3D-0E8DB82115CB}"/>
               </a:ext>
             </a:extLst>
           </p:cNvPr>
@@ -1409,7 +1409,7 @@
           <a:p>
             <a:fld id="{3E91D812-1C9C-49AD-BEC0-7CCA4CF1B6CD}" type="datetimeFigureOut">
               <a:rPr lang="pt-BR" smtClean="0"/>
-              <a:t>13/05/2019</a:t>
+              <a:t>16/05/2019</a:t>
             </a:fld>
             <a:endParaRPr lang="pt-BR"/>
           </a:p>
@@ -1420,7 +1420,7 @@
           <p:cNvPr id="6" name="Espaço Reservado para Rodapé 5">
             <a:extLst>
               <a:ext uri="{FF2B5EF4-FFF2-40B4-BE49-F238E27FC236}">
-                <a16:creationId xmlns:a16="http://schemas.microsoft.com/office/drawing/2014/main" xmlns="" id="{41B1FB1A-14CC-4480-A1B9-1ED302689CFC}"/>
+                <a16:creationId xmlns="" xmlns:a16="http://schemas.microsoft.com/office/drawing/2014/main" id="{41B1FB1A-14CC-4480-A1B9-1ED302689CFC}"/>
               </a:ext>
             </a:extLst>
           </p:cNvPr>
@@ -1445,7 +1445,7 @@
           <p:cNvPr id="7" name="Espaço Reservado para Número de Slide 6">
             <a:extLst>
               <a:ext uri="{FF2B5EF4-FFF2-40B4-BE49-F238E27FC236}">
-                <a16:creationId xmlns:a16="http://schemas.microsoft.com/office/drawing/2014/main" xmlns="" id="{E2005BA8-4851-4BC5-9981-0FD5DC8BBE35}"/>
+                <a16:creationId xmlns="" xmlns:a16="http://schemas.microsoft.com/office/drawing/2014/main" id="{E2005BA8-4851-4BC5-9981-0FD5DC8BBE35}"/>
               </a:ext>
             </a:extLst>
           </p:cNvPr>
@@ -1504,7 +1504,7 @@
           <p:cNvPr id="2" name="Título 1">
             <a:extLst>
               <a:ext uri="{FF2B5EF4-FFF2-40B4-BE49-F238E27FC236}">
-                <a16:creationId xmlns:a16="http://schemas.microsoft.com/office/drawing/2014/main" xmlns="" id="{FCCEAE6E-0DB6-4DD6-9E8D-942971519C0C}"/>
+                <a16:creationId xmlns="" xmlns:a16="http://schemas.microsoft.com/office/drawing/2014/main" id="{FCCEAE6E-0DB6-4DD6-9E8D-942971519C0C}"/>
               </a:ext>
             </a:extLst>
           </p:cNvPr>
@@ -1537,7 +1537,7 @@
           <p:cNvPr id="3" name="Espaço Reservado para Texto 2">
             <a:extLst>
               <a:ext uri="{FF2B5EF4-FFF2-40B4-BE49-F238E27FC236}">
-                <a16:creationId xmlns:a16="http://schemas.microsoft.com/office/drawing/2014/main" xmlns="" id="{3E31BC1A-4AE3-4AF3-9A27-686764CB6BD7}"/>
+                <a16:creationId xmlns="" xmlns:a16="http://schemas.microsoft.com/office/drawing/2014/main" id="{3E31BC1A-4AE3-4AF3-9A27-686764CB6BD7}"/>
               </a:ext>
             </a:extLst>
           </p:cNvPr>
@@ -1608,7 +1608,7 @@
           <p:cNvPr id="4" name="Espaço Reservado para Conteúdo 3">
             <a:extLst>
               <a:ext uri="{FF2B5EF4-FFF2-40B4-BE49-F238E27FC236}">
-                <a16:creationId xmlns:a16="http://schemas.microsoft.com/office/drawing/2014/main" xmlns="" id="{B87E778A-501C-47BA-86D1-EF8A80494C65}"/>
+                <a16:creationId xmlns="" xmlns:a16="http://schemas.microsoft.com/office/drawing/2014/main" id="{B87E778A-501C-47BA-86D1-EF8A80494C65}"/>
               </a:ext>
             </a:extLst>
           </p:cNvPr>
@@ -1670,7 +1670,7 @@
           <p:cNvPr id="5" name="Espaço Reservado para Texto 4">
             <a:extLst>
               <a:ext uri="{FF2B5EF4-FFF2-40B4-BE49-F238E27FC236}">
-                <a16:creationId xmlns:a16="http://schemas.microsoft.com/office/drawing/2014/main" xmlns="" id="{9E1B51EB-499C-460A-9A02-A83AADB4A876}"/>
+                <a16:creationId xmlns="" xmlns:a16="http://schemas.microsoft.com/office/drawing/2014/main" id="{9E1B51EB-499C-460A-9A02-A83AADB4A876}"/>
               </a:ext>
             </a:extLst>
           </p:cNvPr>
@@ -1741,7 +1741,7 @@
           <p:cNvPr id="6" name="Espaço Reservado para Conteúdo 5">
             <a:extLst>
               <a:ext uri="{FF2B5EF4-FFF2-40B4-BE49-F238E27FC236}">
-                <a16:creationId xmlns:a16="http://schemas.microsoft.com/office/drawing/2014/main" xmlns="" id="{4FF8E80F-62A9-424B-B5DC-949D412B1284}"/>
+                <a16:creationId xmlns="" xmlns:a16="http://schemas.microsoft.com/office/drawing/2014/main" id="{4FF8E80F-62A9-424B-B5DC-949D412B1284}"/>
               </a:ext>
             </a:extLst>
           </p:cNvPr>
@@ -1803,7 +1803,7 @@
           <p:cNvPr id="7" name="Espaço Reservado para Data 6">
             <a:extLst>
               <a:ext uri="{FF2B5EF4-FFF2-40B4-BE49-F238E27FC236}">
-                <a16:creationId xmlns:a16="http://schemas.microsoft.com/office/drawing/2014/main" xmlns="" id="{93C511C0-2CCC-4949-89B0-9382BE844DF2}"/>
+                <a16:creationId xmlns="" xmlns:a16="http://schemas.microsoft.com/office/drawing/2014/main" id="{93C511C0-2CCC-4949-89B0-9382BE844DF2}"/>
               </a:ext>
             </a:extLst>
           </p:cNvPr>
@@ -1821,7 +1821,7 @@
           <a:p>
             <a:fld id="{3E91D812-1C9C-49AD-BEC0-7CCA4CF1B6CD}" type="datetimeFigureOut">
               <a:rPr lang="pt-BR" smtClean="0"/>
-              <a:t>13/05/2019</a:t>
+              <a:t>16/05/2019</a:t>
             </a:fld>
             <a:endParaRPr lang="pt-BR"/>
           </a:p>
@@ -1832,7 +1832,7 @@
           <p:cNvPr id="8" name="Espaço Reservado para Rodapé 7">
             <a:extLst>
               <a:ext uri="{FF2B5EF4-FFF2-40B4-BE49-F238E27FC236}">
-                <a16:creationId xmlns:a16="http://schemas.microsoft.com/office/drawing/2014/main" xmlns="" id="{0FC02D5D-7FD1-4942-9A8C-A7BB6DD1C647}"/>
+                <a16:creationId xmlns="" xmlns:a16="http://schemas.microsoft.com/office/drawing/2014/main" id="{0FC02D5D-7FD1-4942-9A8C-A7BB6DD1C647}"/>
               </a:ext>
             </a:extLst>
           </p:cNvPr>
@@ -1857,7 +1857,7 @@
           <p:cNvPr id="9" name="Espaço Reservado para Número de Slide 8">
             <a:extLst>
               <a:ext uri="{FF2B5EF4-FFF2-40B4-BE49-F238E27FC236}">
-                <a16:creationId xmlns:a16="http://schemas.microsoft.com/office/drawing/2014/main" xmlns="" id="{C4BBA6A6-6350-4217-A848-9C79957CA9DB}"/>
+                <a16:creationId xmlns="" xmlns:a16="http://schemas.microsoft.com/office/drawing/2014/main" id="{C4BBA6A6-6350-4217-A848-9C79957CA9DB}"/>
               </a:ext>
             </a:extLst>
           </p:cNvPr>
@@ -1916,7 +1916,7 @@
           <p:cNvPr id="2" name="Título 1">
             <a:extLst>
               <a:ext uri="{FF2B5EF4-FFF2-40B4-BE49-F238E27FC236}">
-                <a16:creationId xmlns:a16="http://schemas.microsoft.com/office/drawing/2014/main" xmlns="" id="{FFE4832D-B170-4A1C-B7C1-67FC0B4EBDD8}"/>
+                <a16:creationId xmlns="" xmlns:a16="http://schemas.microsoft.com/office/drawing/2014/main" id="{FFE4832D-B170-4A1C-B7C1-67FC0B4EBDD8}"/>
               </a:ext>
             </a:extLst>
           </p:cNvPr>
@@ -1944,7 +1944,7 @@
           <p:cNvPr id="3" name="Espaço Reservado para Data 2">
             <a:extLst>
               <a:ext uri="{FF2B5EF4-FFF2-40B4-BE49-F238E27FC236}">
-                <a16:creationId xmlns:a16="http://schemas.microsoft.com/office/drawing/2014/main" xmlns="" id="{23B03EF2-056C-442B-A1CA-38A36E89F4B6}"/>
+                <a16:creationId xmlns="" xmlns:a16="http://schemas.microsoft.com/office/drawing/2014/main" id="{23B03EF2-056C-442B-A1CA-38A36E89F4B6}"/>
               </a:ext>
             </a:extLst>
           </p:cNvPr>
@@ -1962,7 +1962,7 @@
           <a:p>
             <a:fld id="{3E91D812-1C9C-49AD-BEC0-7CCA4CF1B6CD}" type="datetimeFigureOut">
               <a:rPr lang="pt-BR" smtClean="0"/>
-              <a:t>13/05/2019</a:t>
+              <a:t>16/05/2019</a:t>
             </a:fld>
             <a:endParaRPr lang="pt-BR"/>
           </a:p>
@@ -1973,7 +1973,7 @@
           <p:cNvPr id="4" name="Espaço Reservado para Rodapé 3">
             <a:extLst>
               <a:ext uri="{FF2B5EF4-FFF2-40B4-BE49-F238E27FC236}">
-                <a16:creationId xmlns:a16="http://schemas.microsoft.com/office/drawing/2014/main" xmlns="" id="{216C9F26-7D01-4188-94C7-299B1823833F}"/>
+                <a16:creationId xmlns="" xmlns:a16="http://schemas.microsoft.com/office/drawing/2014/main" id="{216C9F26-7D01-4188-94C7-299B1823833F}"/>
               </a:ext>
             </a:extLst>
           </p:cNvPr>
@@ -1998,7 +1998,7 @@
           <p:cNvPr id="5" name="Espaço Reservado para Número de Slide 4">
             <a:extLst>
               <a:ext uri="{FF2B5EF4-FFF2-40B4-BE49-F238E27FC236}">
-                <a16:creationId xmlns:a16="http://schemas.microsoft.com/office/drawing/2014/main" xmlns="" id="{BBC8A12A-0824-4417-8A2C-13955BCA0475}"/>
+                <a16:creationId xmlns="" xmlns:a16="http://schemas.microsoft.com/office/drawing/2014/main" id="{BBC8A12A-0824-4417-8A2C-13955BCA0475}"/>
               </a:ext>
             </a:extLst>
           </p:cNvPr>
@@ -2057,7 +2057,7 @@
           <p:cNvPr id="2" name="Espaço Reservado para Data 1">
             <a:extLst>
               <a:ext uri="{FF2B5EF4-FFF2-40B4-BE49-F238E27FC236}">
-                <a16:creationId xmlns:a16="http://schemas.microsoft.com/office/drawing/2014/main" xmlns="" id="{746D3D2F-36A4-4654-BC90-D08B7C97D78B}"/>
+                <a16:creationId xmlns="" xmlns:a16="http://schemas.microsoft.com/office/drawing/2014/main" id="{746D3D2F-36A4-4654-BC90-D08B7C97D78B}"/>
               </a:ext>
             </a:extLst>
           </p:cNvPr>
@@ -2075,7 +2075,7 @@
           <a:p>
             <a:fld id="{3E91D812-1C9C-49AD-BEC0-7CCA4CF1B6CD}" type="datetimeFigureOut">
               <a:rPr lang="pt-BR" smtClean="0"/>
-              <a:t>13/05/2019</a:t>
+              <a:t>16/05/2019</a:t>
             </a:fld>
             <a:endParaRPr lang="pt-BR"/>
           </a:p>
@@ -2086,7 +2086,7 @@
           <p:cNvPr id="3" name="Espaço Reservado para Rodapé 2">
             <a:extLst>
               <a:ext uri="{FF2B5EF4-FFF2-40B4-BE49-F238E27FC236}">
-                <a16:creationId xmlns:a16="http://schemas.microsoft.com/office/drawing/2014/main" xmlns="" id="{305045F9-28E0-4E82-A36C-B86C375E66EB}"/>
+                <a16:creationId xmlns="" xmlns:a16="http://schemas.microsoft.com/office/drawing/2014/main" id="{305045F9-28E0-4E82-A36C-B86C375E66EB}"/>
               </a:ext>
             </a:extLst>
           </p:cNvPr>
@@ -2111,7 +2111,7 @@
           <p:cNvPr id="4" name="Espaço Reservado para Número de Slide 3">
             <a:extLst>
               <a:ext uri="{FF2B5EF4-FFF2-40B4-BE49-F238E27FC236}">
-                <a16:creationId xmlns:a16="http://schemas.microsoft.com/office/drawing/2014/main" xmlns="" id="{7AAE7D08-DEC1-4182-A1BC-4B0B3E0138E3}"/>
+                <a16:creationId xmlns="" xmlns:a16="http://schemas.microsoft.com/office/drawing/2014/main" id="{7AAE7D08-DEC1-4182-A1BC-4B0B3E0138E3}"/>
               </a:ext>
             </a:extLst>
           </p:cNvPr>
@@ -2170,7 +2170,7 @@
           <p:cNvPr id="2" name="Título 1">
             <a:extLst>
               <a:ext uri="{FF2B5EF4-FFF2-40B4-BE49-F238E27FC236}">
-                <a16:creationId xmlns:a16="http://schemas.microsoft.com/office/drawing/2014/main" xmlns="" id="{14488850-8AE5-48F5-8E5C-92AA64BE2B34}"/>
+                <a16:creationId xmlns="" xmlns:a16="http://schemas.microsoft.com/office/drawing/2014/main" id="{14488850-8AE5-48F5-8E5C-92AA64BE2B34}"/>
               </a:ext>
             </a:extLst>
           </p:cNvPr>
@@ -2207,7 +2207,7 @@
           <p:cNvPr id="3" name="Espaço Reservado para Conteúdo 2">
             <a:extLst>
               <a:ext uri="{FF2B5EF4-FFF2-40B4-BE49-F238E27FC236}">
-                <a16:creationId xmlns:a16="http://schemas.microsoft.com/office/drawing/2014/main" xmlns="" id="{F30D7389-91C0-40F6-8EB5-D0F3EC595EF2}"/>
+                <a16:creationId xmlns="" xmlns:a16="http://schemas.microsoft.com/office/drawing/2014/main" id="{F30D7389-91C0-40F6-8EB5-D0F3EC595EF2}"/>
               </a:ext>
             </a:extLst>
           </p:cNvPr>
@@ -2297,7 +2297,7 @@
           <p:cNvPr id="4" name="Espaço Reservado para Texto 3">
             <a:extLst>
               <a:ext uri="{FF2B5EF4-FFF2-40B4-BE49-F238E27FC236}">
-                <a16:creationId xmlns:a16="http://schemas.microsoft.com/office/drawing/2014/main" xmlns="" id="{69F5104B-587D-44FD-9EEC-494E3BC3E8E9}"/>
+                <a16:creationId xmlns="" xmlns:a16="http://schemas.microsoft.com/office/drawing/2014/main" id="{69F5104B-587D-44FD-9EEC-494E3BC3E8E9}"/>
               </a:ext>
             </a:extLst>
           </p:cNvPr>
@@ -2368,7 +2368,7 @@
           <p:cNvPr id="5" name="Espaço Reservado para Data 4">
             <a:extLst>
               <a:ext uri="{FF2B5EF4-FFF2-40B4-BE49-F238E27FC236}">
-                <a16:creationId xmlns:a16="http://schemas.microsoft.com/office/drawing/2014/main" xmlns="" id="{379D1885-6D8A-49DA-AFE4-999D64EAFF67}"/>
+                <a16:creationId xmlns="" xmlns:a16="http://schemas.microsoft.com/office/drawing/2014/main" id="{379D1885-6D8A-49DA-AFE4-999D64EAFF67}"/>
               </a:ext>
             </a:extLst>
           </p:cNvPr>
@@ -2386,7 +2386,7 @@
           <a:p>
             <a:fld id="{3E91D812-1C9C-49AD-BEC0-7CCA4CF1B6CD}" type="datetimeFigureOut">
               <a:rPr lang="pt-BR" smtClean="0"/>
-              <a:t>13/05/2019</a:t>
+              <a:t>16/05/2019</a:t>
             </a:fld>
             <a:endParaRPr lang="pt-BR"/>
           </a:p>
@@ -2397,7 +2397,7 @@
           <p:cNvPr id="6" name="Espaço Reservado para Rodapé 5">
             <a:extLst>
               <a:ext uri="{FF2B5EF4-FFF2-40B4-BE49-F238E27FC236}">
-                <a16:creationId xmlns:a16="http://schemas.microsoft.com/office/drawing/2014/main" xmlns="" id="{D6AA084E-976C-4578-A753-E4B2128A8207}"/>
+                <a16:creationId xmlns="" xmlns:a16="http://schemas.microsoft.com/office/drawing/2014/main" id="{D6AA084E-976C-4578-A753-E4B2128A8207}"/>
               </a:ext>
             </a:extLst>
           </p:cNvPr>
@@ -2422,7 +2422,7 @@
           <p:cNvPr id="7" name="Espaço Reservado para Número de Slide 6">
             <a:extLst>
               <a:ext uri="{FF2B5EF4-FFF2-40B4-BE49-F238E27FC236}">
-                <a16:creationId xmlns:a16="http://schemas.microsoft.com/office/drawing/2014/main" xmlns="" id="{5303A1E9-9AE5-42C1-B110-7434D278DB50}"/>
+                <a16:creationId xmlns="" xmlns:a16="http://schemas.microsoft.com/office/drawing/2014/main" id="{5303A1E9-9AE5-42C1-B110-7434D278DB50}"/>
               </a:ext>
             </a:extLst>
           </p:cNvPr>
@@ -2481,7 +2481,7 @@
           <p:cNvPr id="2" name="Título 1">
             <a:extLst>
               <a:ext uri="{FF2B5EF4-FFF2-40B4-BE49-F238E27FC236}">
-                <a16:creationId xmlns:a16="http://schemas.microsoft.com/office/drawing/2014/main" xmlns="" id="{C7DDD54D-A15E-4EA2-A292-D6A1C4C82836}"/>
+                <a16:creationId xmlns="" xmlns:a16="http://schemas.microsoft.com/office/drawing/2014/main" id="{C7DDD54D-A15E-4EA2-A292-D6A1C4C82836}"/>
               </a:ext>
             </a:extLst>
           </p:cNvPr>
@@ -2518,7 +2518,7 @@
           <p:cNvPr id="3" name="Espaço Reservado para Imagem 2">
             <a:extLst>
               <a:ext uri="{FF2B5EF4-FFF2-40B4-BE49-F238E27FC236}">
-                <a16:creationId xmlns:a16="http://schemas.microsoft.com/office/drawing/2014/main" xmlns="" id="{838BA2FE-0799-4382-AB5A-0467ECC3B9E4}"/>
+                <a16:creationId xmlns="" xmlns:a16="http://schemas.microsoft.com/office/drawing/2014/main" id="{838BA2FE-0799-4382-AB5A-0467ECC3B9E4}"/>
               </a:ext>
             </a:extLst>
           </p:cNvPr>
@@ -2585,7 +2585,7 @@
           <p:cNvPr id="4" name="Espaço Reservado para Texto 3">
             <a:extLst>
               <a:ext uri="{FF2B5EF4-FFF2-40B4-BE49-F238E27FC236}">
-                <a16:creationId xmlns:a16="http://schemas.microsoft.com/office/drawing/2014/main" xmlns="" id="{81CF12AD-6D7B-40B1-A922-1E4E17DA7C18}"/>
+                <a16:creationId xmlns="" xmlns:a16="http://schemas.microsoft.com/office/drawing/2014/main" id="{81CF12AD-6D7B-40B1-A922-1E4E17DA7C18}"/>
               </a:ext>
             </a:extLst>
           </p:cNvPr>
@@ -2656,7 +2656,7 @@
           <p:cNvPr id="5" name="Espaço Reservado para Data 4">
             <a:extLst>
               <a:ext uri="{FF2B5EF4-FFF2-40B4-BE49-F238E27FC236}">
-                <a16:creationId xmlns:a16="http://schemas.microsoft.com/office/drawing/2014/main" xmlns="" id="{A9D19DF7-4077-42CA-9EB5-A03CCC04776C}"/>
+                <a16:creationId xmlns="" xmlns:a16="http://schemas.microsoft.com/office/drawing/2014/main" id="{A9D19DF7-4077-42CA-9EB5-A03CCC04776C}"/>
               </a:ext>
             </a:extLst>
           </p:cNvPr>
@@ -2674,7 +2674,7 @@
           <a:p>
             <a:fld id="{3E91D812-1C9C-49AD-BEC0-7CCA4CF1B6CD}" type="datetimeFigureOut">
               <a:rPr lang="pt-BR" smtClean="0"/>
-              <a:t>13/05/2019</a:t>
+              <a:t>16/05/2019</a:t>
             </a:fld>
             <a:endParaRPr lang="pt-BR"/>
           </a:p>
@@ -2685,7 +2685,7 @@
           <p:cNvPr id="6" name="Espaço Reservado para Rodapé 5">
             <a:extLst>
               <a:ext uri="{FF2B5EF4-FFF2-40B4-BE49-F238E27FC236}">
-                <a16:creationId xmlns:a16="http://schemas.microsoft.com/office/drawing/2014/main" xmlns="" id="{DE1A1C2D-E571-4A01-B309-5B33661B8B15}"/>
+                <a16:creationId xmlns="" xmlns:a16="http://schemas.microsoft.com/office/drawing/2014/main" id="{DE1A1C2D-E571-4A01-B309-5B33661B8B15}"/>
               </a:ext>
             </a:extLst>
           </p:cNvPr>
@@ -2710,7 +2710,7 @@
           <p:cNvPr id="7" name="Espaço Reservado para Número de Slide 6">
             <a:extLst>
               <a:ext uri="{FF2B5EF4-FFF2-40B4-BE49-F238E27FC236}">
-                <a16:creationId xmlns:a16="http://schemas.microsoft.com/office/drawing/2014/main" xmlns="" id="{08F653C0-8DD7-43C1-BEC6-1E93DB69F5B9}"/>
+                <a16:creationId xmlns="" xmlns:a16="http://schemas.microsoft.com/office/drawing/2014/main" id="{08F653C0-8DD7-43C1-BEC6-1E93DB69F5B9}"/>
               </a:ext>
             </a:extLst>
           </p:cNvPr>
@@ -2774,7 +2774,7 @@
           <p:cNvPr id="2" name="Espaço Reservado para Título 1">
             <a:extLst>
               <a:ext uri="{FF2B5EF4-FFF2-40B4-BE49-F238E27FC236}">
-                <a16:creationId xmlns:a16="http://schemas.microsoft.com/office/drawing/2014/main" xmlns="" id="{B723CC3C-D42A-4FE4-B09C-1BF909783445}"/>
+                <a16:creationId xmlns="" xmlns:a16="http://schemas.microsoft.com/office/drawing/2014/main" id="{B723CC3C-D42A-4FE4-B09C-1BF909783445}"/>
               </a:ext>
             </a:extLst>
           </p:cNvPr>
@@ -2812,7 +2812,7 @@
           <p:cNvPr id="3" name="Espaço Reservado para Texto 2">
             <a:extLst>
               <a:ext uri="{FF2B5EF4-FFF2-40B4-BE49-F238E27FC236}">
-                <a16:creationId xmlns:a16="http://schemas.microsoft.com/office/drawing/2014/main" xmlns="" id="{2BD6F6AE-CF78-4AE8-8CF8-EBFE2DB3B111}"/>
+                <a16:creationId xmlns="" xmlns:a16="http://schemas.microsoft.com/office/drawing/2014/main" id="{2BD6F6AE-CF78-4AE8-8CF8-EBFE2DB3B111}"/>
               </a:ext>
             </a:extLst>
           </p:cNvPr>
@@ -2879,7 +2879,7 @@
           <p:cNvPr id="4" name="Espaço Reservado para Data 3">
             <a:extLst>
               <a:ext uri="{FF2B5EF4-FFF2-40B4-BE49-F238E27FC236}">
-                <a16:creationId xmlns:a16="http://schemas.microsoft.com/office/drawing/2014/main" xmlns="" id="{D8346109-BE5F-41F4-B42C-6F0F6D77301A}"/>
+                <a16:creationId xmlns="" xmlns:a16="http://schemas.microsoft.com/office/drawing/2014/main" id="{D8346109-BE5F-41F4-B42C-6F0F6D77301A}"/>
               </a:ext>
             </a:extLst>
           </p:cNvPr>
@@ -2915,7 +2915,7 @@
           <a:p>
             <a:fld id="{3E91D812-1C9C-49AD-BEC0-7CCA4CF1B6CD}" type="datetimeFigureOut">
               <a:rPr lang="pt-BR" smtClean="0"/>
-              <a:t>13/05/2019</a:t>
+              <a:t>16/05/2019</a:t>
             </a:fld>
             <a:endParaRPr lang="pt-BR"/>
           </a:p>
@@ -2926,7 +2926,7 @@
           <p:cNvPr id="5" name="Espaço Reservado para Rodapé 4">
             <a:extLst>
               <a:ext uri="{FF2B5EF4-FFF2-40B4-BE49-F238E27FC236}">
-                <a16:creationId xmlns:a16="http://schemas.microsoft.com/office/drawing/2014/main" xmlns="" id="{CD3C5ACE-85F6-4C7A-8EA1-EDA7AAF6C284}"/>
+                <a16:creationId xmlns="" xmlns:a16="http://schemas.microsoft.com/office/drawing/2014/main" id="{CD3C5ACE-85F6-4C7A-8EA1-EDA7AAF6C284}"/>
               </a:ext>
             </a:extLst>
           </p:cNvPr>
@@ -2969,7 +2969,7 @@
           <p:cNvPr id="6" name="Espaço Reservado para Número de Slide 5">
             <a:extLst>
               <a:ext uri="{FF2B5EF4-FFF2-40B4-BE49-F238E27FC236}">
-                <a16:creationId xmlns:a16="http://schemas.microsoft.com/office/drawing/2014/main" xmlns="" id="{C8B16C26-275E-40C9-AF52-5C46E4F94B72}"/>
+                <a16:creationId xmlns="" xmlns:a16="http://schemas.microsoft.com/office/drawing/2014/main" id="{C8B16C26-275E-40C9-AF52-5C46E4F94B72}"/>
               </a:ext>
             </a:extLst>
           </p:cNvPr>
@@ -3344,7 +3344,7 @@
         </p:nvSpPr>
         <p:spPr>
           <a:xfrm>
-            <a:off x="1376819" y="1465545"/>
+            <a:off x="587680" y="3757808"/>
             <a:ext cx="10515600" cy="2154151"/>
           </a:xfrm>
         </p:spPr>
@@ -3354,70 +3354,67 @@
           </a:bodyPr>
           <a:lstStyle/>
           <a:p>
+            <a:pPr algn="ctr"/>
             <a:r>
               <a:rPr lang="pt-BR" dirty="0"/>
-              <a:t/>
+              <a:t>Israel Souto dos Santos RA:1800866</a:t>
             </a:r>
             <a:br>
               <a:rPr lang="pt-BR" dirty="0"/>
             </a:br>
             <a:r>
+              <a:rPr lang="pt-BR" dirty="0" err="1"/>
+              <a:t>Kayke</a:t>
+            </a:r>
+            <a:r>
               <a:rPr lang="pt-BR" dirty="0"/>
-              <a:t>					ADS 3B </a:t>
+              <a:t> Bento Aleixo  RA:1801013</a:t>
             </a:r>
             <a:br>
               <a:rPr lang="pt-BR" dirty="0"/>
             </a:br>
             <a:r>
               <a:rPr lang="pt-BR" dirty="0"/>
-              <a:t/>
+              <a:t>Matheus Rocha Garcia Sanches RA:1800777</a:t>
             </a:r>
             <a:br>
               <a:rPr lang="pt-BR" dirty="0"/>
             </a:br>
             <a:r>
               <a:rPr lang="pt-BR" dirty="0"/>
-              <a:t>Israel Souto dos Santos RA:1800866</a:t>
-            </a:r>
-            <a:br>
-              <a:rPr lang="pt-BR" dirty="0"/>
-            </a:br>
-            <a:r>
-              <a:rPr lang="pt-BR" dirty="0"/>
-              <a:t>Kayke Bento Aleixo  RA:1801013</a:t>
-            </a:r>
-            <a:br>
-              <a:rPr lang="pt-BR" dirty="0"/>
-            </a:br>
-            <a:r>
-              <a:rPr lang="pt-BR" dirty="0"/>
-              <a:t>Matheus Rocha Garcia Sanches RA:1800777</a:t>
-            </a:r>
-            <a:br>
-              <a:rPr lang="pt-BR" dirty="0"/>
-            </a:br>
-            <a:r>
-              <a:rPr lang="pt-BR" dirty="0"/>
               <a:t>Lucas Kurata  RA: 1800794</a:t>
             </a:r>
-            <a:br>
-              <a:rPr lang="pt-BR" dirty="0"/>
-            </a:br>
-            <a:r>
-              <a:rPr lang="pt-BR" dirty="0"/>
-              <a:t/>
-            </a:r>
-            <a:br>
-              <a:rPr lang="pt-BR" dirty="0"/>
-            </a:br>
-            <a:r>
-              <a:rPr lang="pt-BR" dirty="0"/>
-              <a:t/>
-            </a:r>
-            <a:br>
-              <a:rPr lang="pt-BR" dirty="0"/>
-            </a:br>
             <a:endParaRPr lang="pt-BR" dirty="0"/>
+          </a:p>
+        </p:txBody>
+      </p:sp>
+      <p:sp>
+        <p:nvSpPr>
+          <p:cNvPr id="3" name="CaixaDeTexto 2"/>
+          <p:cNvSpPr txBox="1"/>
+          <p:nvPr/>
+        </p:nvSpPr>
+        <p:spPr>
+          <a:xfrm>
+            <a:off x="4906761" y="876822"/>
+            <a:ext cx="1877437" cy="769441"/>
+          </a:xfrm>
+          <a:prstGeom prst="rect">
+            <a:avLst/>
+          </a:prstGeom>
+          <a:noFill/>
+        </p:spPr>
+        <p:txBody>
+          <a:bodyPr wrap="none" rtlCol="0">
+            <a:spAutoFit/>
+          </a:bodyPr>
+          <a:lstStyle/>
+          <a:p>
+            <a:r>
+              <a:rPr lang="pt-BR" sz="4400" b="1" dirty="0" smtClean="0"/>
+              <a:t>ADS 3B</a:t>
+            </a:r>
+            <a:endParaRPr lang="pt-BR" sz="4400" b="1" dirty="0"/>
           </a:p>
         </p:txBody>
       </p:sp>
@@ -3456,7 +3453,7 @@
           <p:cNvPr id="5" name="Título 1">
             <a:extLst>
               <a:ext uri="{FF2B5EF4-FFF2-40B4-BE49-F238E27FC236}">
-                <a16:creationId xmlns:a16="http://schemas.microsoft.com/office/drawing/2014/main" xmlns="" id="{68D3818B-3607-48B5-996D-457DBB256B86}"/>
+                <a16:creationId xmlns="" xmlns:a16="http://schemas.microsoft.com/office/drawing/2014/main" id="{68D3818B-3607-48B5-996D-457DBB256B86}"/>
               </a:ext>
             </a:extLst>
           </p:cNvPr>
@@ -3491,7 +3488,7 @@
       </p:sp>
       <p:pic>
         <p:nvPicPr>
-          <p:cNvPr id="8" name="Imagem 7"/>
+          <p:cNvPr id="2" name="Imagem 1"/>
           <p:cNvPicPr>
             <a:picLocks noChangeAspect="1"/>
           </p:cNvPicPr>
@@ -3505,8 +3502,8 @@
         </p:blipFill>
         <p:spPr>
           <a:xfrm>
-            <a:off x="902260" y="1892291"/>
-            <a:ext cx="9769498" cy="3280958"/>
+            <a:off x="766109" y="2273473"/>
+            <a:ext cx="10658215" cy="2661781"/>
           </a:xfrm>
           <a:prstGeom prst="rect">
             <a:avLst/>
@@ -3548,7 +3545,7 @@
           <p:cNvPr id="3" name="CaixaDeTexto 2">
             <a:extLst>
               <a:ext uri="{FF2B5EF4-FFF2-40B4-BE49-F238E27FC236}">
-                <a16:creationId xmlns:a16="http://schemas.microsoft.com/office/drawing/2014/main" xmlns="" id="{9DEB5893-3D89-4338-9031-7B6687C3B3F7}"/>
+                <a16:creationId xmlns="" xmlns:a16="http://schemas.microsoft.com/office/drawing/2014/main" id="{9DEB5893-3D89-4338-9031-7B6687C3B3F7}"/>
               </a:ext>
             </a:extLst>
           </p:cNvPr>
@@ -3586,7 +3583,7 @@
           <p:cNvPr id="4" name="Elipse 3">
             <a:extLst>
               <a:ext uri="{FF2B5EF4-FFF2-40B4-BE49-F238E27FC236}">
-                <a16:creationId xmlns:a16="http://schemas.microsoft.com/office/drawing/2014/main" xmlns="" id="{733D9463-1D9C-47D1-9A54-5A4BB5B380F1}"/>
+                <a16:creationId xmlns="" xmlns:a16="http://schemas.microsoft.com/office/drawing/2014/main" id="{733D9463-1D9C-47D1-9A54-5A4BB5B380F1}"/>
               </a:ext>
             </a:extLst>
           </p:cNvPr>
@@ -3649,7 +3646,7 @@
           <p:cNvPr id="5" name="Retângulo 4">
             <a:extLst>
               <a:ext uri="{FF2B5EF4-FFF2-40B4-BE49-F238E27FC236}">
-                <a16:creationId xmlns:a16="http://schemas.microsoft.com/office/drawing/2014/main" xmlns="" id="{0CC26930-06B7-446D-B2D0-62CD2CD8CDE6}"/>
+                <a16:creationId xmlns="" xmlns:a16="http://schemas.microsoft.com/office/drawing/2014/main" id="{0CC26930-06B7-446D-B2D0-62CD2CD8CDE6}"/>
               </a:ext>
             </a:extLst>
           </p:cNvPr>
@@ -3705,7 +3702,7 @@
           <p:cNvPr id="6" name="CaixaDeTexto 5">
             <a:extLst>
               <a:ext uri="{FF2B5EF4-FFF2-40B4-BE49-F238E27FC236}">
-                <a16:creationId xmlns:a16="http://schemas.microsoft.com/office/drawing/2014/main" xmlns="" id="{4E7FD3A7-F7AE-4A59-864C-9EA0D14114F4}"/>
+                <a16:creationId xmlns="" xmlns:a16="http://schemas.microsoft.com/office/drawing/2014/main" id="{4E7FD3A7-F7AE-4A59-864C-9EA0D14114F4}"/>
               </a:ext>
             </a:extLst>
           </p:cNvPr>
@@ -3743,7 +3740,7 @@
           <p:cNvPr id="7" name="CaixaDeTexto 6">
             <a:extLst>
               <a:ext uri="{FF2B5EF4-FFF2-40B4-BE49-F238E27FC236}">
-                <a16:creationId xmlns:a16="http://schemas.microsoft.com/office/drawing/2014/main" xmlns="" id="{8F9D155D-983B-42A0-B6ED-82B9ECA84AE8}"/>
+                <a16:creationId xmlns="" xmlns:a16="http://schemas.microsoft.com/office/drawing/2014/main" id="{8F9D155D-983B-42A0-B6ED-82B9ECA84AE8}"/>
               </a:ext>
             </a:extLst>
           </p:cNvPr>
@@ -3778,7 +3775,7 @@
           <p:cNvPr id="8" name="CaixaDeTexto 7">
             <a:extLst>
               <a:ext uri="{FF2B5EF4-FFF2-40B4-BE49-F238E27FC236}">
-                <a16:creationId xmlns:a16="http://schemas.microsoft.com/office/drawing/2014/main" xmlns="" id="{0569AFC7-D775-40F1-872B-41901CA6A862}"/>
+                <a16:creationId xmlns="" xmlns:a16="http://schemas.microsoft.com/office/drawing/2014/main" id="{0569AFC7-D775-40F1-872B-41901CA6A862}"/>
               </a:ext>
             </a:extLst>
           </p:cNvPr>
@@ -3846,7 +3843,7 @@
           <p:cNvPr id="9" name="Título 1">
             <a:extLst>
               <a:ext uri="{FF2B5EF4-FFF2-40B4-BE49-F238E27FC236}">
-                <a16:creationId xmlns:a16="http://schemas.microsoft.com/office/drawing/2014/main" xmlns="" id="{2CE124F1-3208-4A64-A1E2-CBFFA946E0FC}"/>
+                <a16:creationId xmlns="" xmlns:a16="http://schemas.microsoft.com/office/drawing/2014/main" id="{2CE124F1-3208-4A64-A1E2-CBFFA946E0FC}"/>
               </a:ext>
             </a:extLst>
           </p:cNvPr>
@@ -3916,7 +3913,7 @@
           <p:cNvPr id="10" name="AutoShape 7">
             <a:extLst>
               <a:ext uri="{FF2B5EF4-FFF2-40B4-BE49-F238E27FC236}">
-                <a16:creationId xmlns:a16="http://schemas.microsoft.com/office/drawing/2014/main" xmlns="" id="{B6CFFC71-622A-49CF-A541-0209CA74C169}"/>
+                <a16:creationId xmlns="" xmlns:a16="http://schemas.microsoft.com/office/drawing/2014/main" id="{B6CFFC71-622A-49CF-A541-0209CA74C169}"/>
               </a:ext>
             </a:extLst>
           </p:cNvPr>
@@ -3951,7 +3948,7 @@
           <p:cNvPr id="11" name="CaixaDeTexto 10">
             <a:extLst>
               <a:ext uri="{FF2B5EF4-FFF2-40B4-BE49-F238E27FC236}">
-                <a16:creationId xmlns:a16="http://schemas.microsoft.com/office/drawing/2014/main" xmlns="" id="{098D77BD-1654-4443-9CDB-024A17D371A0}"/>
+                <a16:creationId xmlns="" xmlns:a16="http://schemas.microsoft.com/office/drawing/2014/main" id="{098D77BD-1654-4443-9CDB-024A17D371A0}"/>
               </a:ext>
             </a:extLst>
           </p:cNvPr>
@@ -4033,7 +4030,7 @@
           <p:cNvPr id="12" name="AutoShape 13">
             <a:extLst>
               <a:ext uri="{FF2B5EF4-FFF2-40B4-BE49-F238E27FC236}">
-                <a16:creationId xmlns:a16="http://schemas.microsoft.com/office/drawing/2014/main" xmlns="" id="{EACFF932-9CE6-4528-AF5D-769AE98ECC45}"/>
+                <a16:creationId xmlns="" xmlns:a16="http://schemas.microsoft.com/office/drawing/2014/main" id="{EACFF932-9CE6-4528-AF5D-769AE98ECC45}"/>
               </a:ext>
             </a:extLst>
           </p:cNvPr>
@@ -4068,7 +4065,7 @@
           <p:cNvPr id="37" name="Group 25">
             <a:extLst>
               <a:ext uri="{FF2B5EF4-FFF2-40B4-BE49-F238E27FC236}">
-                <a16:creationId xmlns:a16="http://schemas.microsoft.com/office/drawing/2014/main" xmlns="" id="{3F705C9F-3B6E-458B-BFC0-91560F963B7D}"/>
+                <a16:creationId xmlns="" xmlns:a16="http://schemas.microsoft.com/office/drawing/2014/main" id="{3F705C9F-3B6E-458B-BFC0-91560F963B7D}"/>
               </a:ext>
             </a:extLst>
           </p:cNvPr>
@@ -4090,7 +4087,7 @@
             <p:cNvPr id="38" name="Rectangle 28">
               <a:extLst>
                 <a:ext uri="{FF2B5EF4-FFF2-40B4-BE49-F238E27FC236}">
-                  <a16:creationId xmlns:a16="http://schemas.microsoft.com/office/drawing/2014/main" xmlns="" id="{27B70F3D-4F3F-4374-B8BB-6E5063B9CB24}"/>
+                  <a16:creationId xmlns="" xmlns:a16="http://schemas.microsoft.com/office/drawing/2014/main" id="{27B70F3D-4F3F-4374-B8BB-6E5063B9CB24}"/>
                 </a:ext>
               </a:extLst>
             </p:cNvPr>
@@ -4144,7 +4141,7 @@
             <p:cNvPr id="39" name="Rectangle 27">
               <a:extLst>
                 <a:ext uri="{FF2B5EF4-FFF2-40B4-BE49-F238E27FC236}">
-                  <a16:creationId xmlns:a16="http://schemas.microsoft.com/office/drawing/2014/main" xmlns="" id="{B77602A2-46E8-4FD0-875B-3F461B8215A2}"/>
+                  <a16:creationId xmlns="" xmlns:a16="http://schemas.microsoft.com/office/drawing/2014/main" id="{B77602A2-46E8-4FD0-875B-3F461B8215A2}"/>
                 </a:ext>
               </a:extLst>
             </p:cNvPr>
@@ -4184,7 +4181,7 @@
             <p:cNvPr id="40" name="Rectangle 26">
               <a:extLst>
                 <a:ext uri="{FF2B5EF4-FFF2-40B4-BE49-F238E27FC236}">
-                  <a16:creationId xmlns:a16="http://schemas.microsoft.com/office/drawing/2014/main" xmlns="" id="{8535477C-D3A6-46EE-B00C-5AC4698444D8}"/>
+                  <a16:creationId xmlns="" xmlns:a16="http://schemas.microsoft.com/office/drawing/2014/main" id="{8535477C-D3A6-46EE-B00C-5AC4698444D8}"/>
                 </a:ext>
               </a:extLst>
             </p:cNvPr>
@@ -4225,7 +4222,7 @@
           <p:cNvPr id="13" name="Conector de Seta Reta 12">
             <a:extLst>
               <a:ext uri="{FF2B5EF4-FFF2-40B4-BE49-F238E27FC236}">
-                <a16:creationId xmlns:a16="http://schemas.microsoft.com/office/drawing/2014/main" xmlns="" id="{3D0DA81B-B289-42DC-9B58-D0483FCF3B51}"/>
+                <a16:creationId xmlns="" xmlns:a16="http://schemas.microsoft.com/office/drawing/2014/main" id="{3D0DA81B-B289-42DC-9B58-D0483FCF3B51}"/>
               </a:ext>
             </a:extLst>
           </p:cNvPr>
@@ -4301,7 +4298,7 @@
           <p:cNvPr id="183" name="CaixaDeTexto 182">
             <a:extLst>
               <a:ext uri="{FF2B5EF4-FFF2-40B4-BE49-F238E27FC236}">
-                <a16:creationId xmlns:a16="http://schemas.microsoft.com/office/drawing/2014/main" xmlns="" id="{456A8FEB-B6F7-41CD-8E1F-9192EA17CB4C}"/>
+                <a16:creationId xmlns="" xmlns:a16="http://schemas.microsoft.com/office/drawing/2014/main" id="{456A8FEB-B6F7-41CD-8E1F-9192EA17CB4C}"/>
               </a:ext>
             </a:extLst>
           </p:cNvPr>
@@ -4339,7 +4336,7 @@
           <p:cNvPr id="3" name="Imagem 2">
             <a:extLst>
               <a:ext uri="{FF2B5EF4-FFF2-40B4-BE49-F238E27FC236}">
-                <a16:creationId xmlns:a16="http://schemas.microsoft.com/office/drawing/2014/main" xmlns="" id="{C782F6AB-5DE5-4BF3-ACCF-018CB4BA875B}"/>
+                <a16:creationId xmlns="" xmlns:a16="http://schemas.microsoft.com/office/drawing/2014/main" id="{C782F6AB-5DE5-4BF3-ACCF-018CB4BA875B}"/>
               </a:ext>
             </a:extLst>
           </p:cNvPr>
@@ -4434,7 +4431,7 @@
           <p:cNvPr id="3" name="Imagem 2">
             <a:extLst>
               <a:ext uri="{FF2B5EF4-FFF2-40B4-BE49-F238E27FC236}">
-                <a16:creationId xmlns:a16="http://schemas.microsoft.com/office/drawing/2014/main" xmlns="" id="{AD230B72-595E-4A9B-A398-C483D47A545C}"/>
+                <a16:creationId xmlns="" xmlns:a16="http://schemas.microsoft.com/office/drawing/2014/main" id="{AD230B72-595E-4A9B-A398-C483D47A545C}"/>
               </a:ext>
             </a:extLst>
           </p:cNvPr>
@@ -4517,14 +4514,14 @@
                 <a:gridCol w="4064000">
                   <a:extLst>
                     <a:ext uri="{9D8B030D-6E8A-4147-A177-3AD203B41FA5}">
-                      <a16:colId xmlns:a16="http://schemas.microsoft.com/office/drawing/2014/main" xmlns="" val="20000"/>
+                      <a16:colId xmlns="" xmlns:a16="http://schemas.microsoft.com/office/drawing/2014/main" val="20000"/>
                     </a:ext>
                   </a:extLst>
                 </a:gridCol>
                 <a:gridCol w="4064000">
                   <a:extLst>
                     <a:ext uri="{9D8B030D-6E8A-4147-A177-3AD203B41FA5}">
-                      <a16:colId xmlns:a16="http://schemas.microsoft.com/office/drawing/2014/main" xmlns="" val="20001"/>
+                      <a16:colId xmlns="" xmlns:a16="http://schemas.microsoft.com/office/drawing/2014/main" val="20001"/>
                     </a:ext>
                   </a:extLst>
                 </a:gridCol>
@@ -4561,7 +4558,7 @@
                 </a:tc>
                 <a:extLst>
                   <a:ext uri="{0D108BD9-81ED-4DB2-BD59-A6C34878D82A}">
-                    <a16:rowId xmlns:a16="http://schemas.microsoft.com/office/drawing/2014/main" xmlns="" val="10000"/>
+                    <a16:rowId xmlns="" xmlns:a16="http://schemas.microsoft.com/office/drawing/2014/main" val="10000"/>
                   </a:ext>
                 </a:extLst>
               </a:tr>
@@ -4600,7 +4597,7 @@
                 </a:tc>
                 <a:extLst>
                   <a:ext uri="{0D108BD9-81ED-4DB2-BD59-A6C34878D82A}">
-                    <a16:rowId xmlns:a16="http://schemas.microsoft.com/office/drawing/2014/main" xmlns="" val="10001"/>
+                    <a16:rowId xmlns="" xmlns:a16="http://schemas.microsoft.com/office/drawing/2014/main" val="10001"/>
                   </a:ext>
                 </a:extLst>
               </a:tr>
@@ -4639,7 +4636,7 @@
                 </a:tc>
                 <a:extLst>
                   <a:ext uri="{0D108BD9-81ED-4DB2-BD59-A6C34878D82A}">
-                    <a16:rowId xmlns:a16="http://schemas.microsoft.com/office/drawing/2014/main" xmlns="" val="10002"/>
+                    <a16:rowId xmlns="" xmlns:a16="http://schemas.microsoft.com/office/drawing/2014/main" val="10002"/>
                   </a:ext>
                 </a:extLst>
               </a:tr>
@@ -4705,14 +4702,14 @@
                 <a:gridCol w="4064000">
                   <a:extLst>
                     <a:ext uri="{9D8B030D-6E8A-4147-A177-3AD203B41FA5}">
-                      <a16:colId xmlns:a16="http://schemas.microsoft.com/office/drawing/2014/main" xmlns="" val="20000"/>
+                      <a16:colId xmlns="" xmlns:a16="http://schemas.microsoft.com/office/drawing/2014/main" val="20000"/>
                     </a:ext>
                   </a:extLst>
                 </a:gridCol>
                 <a:gridCol w="4064000">
                   <a:extLst>
                     <a:ext uri="{9D8B030D-6E8A-4147-A177-3AD203B41FA5}">
-                      <a16:colId xmlns:a16="http://schemas.microsoft.com/office/drawing/2014/main" xmlns="" val="20001"/>
+                      <a16:colId xmlns="" xmlns:a16="http://schemas.microsoft.com/office/drawing/2014/main" val="20001"/>
                     </a:ext>
                   </a:extLst>
                 </a:gridCol>
@@ -4748,7 +4745,7 @@
                 </a:tc>
                 <a:extLst>
                   <a:ext uri="{0D108BD9-81ED-4DB2-BD59-A6C34878D82A}">
-                    <a16:rowId xmlns:a16="http://schemas.microsoft.com/office/drawing/2014/main" xmlns="" val="10000"/>
+                    <a16:rowId xmlns="" xmlns:a16="http://schemas.microsoft.com/office/drawing/2014/main" val="10000"/>
                   </a:ext>
                 </a:extLst>
               </a:tr>
@@ -4783,7 +4780,7 @@
                 </a:tc>
                 <a:extLst>
                   <a:ext uri="{0D108BD9-81ED-4DB2-BD59-A6C34878D82A}">
-                    <a16:rowId xmlns:a16="http://schemas.microsoft.com/office/drawing/2014/main" xmlns="" val="10001"/>
+                    <a16:rowId xmlns="" xmlns:a16="http://schemas.microsoft.com/office/drawing/2014/main" val="10001"/>
                   </a:ext>
                 </a:extLst>
               </a:tr>
@@ -4818,7 +4815,7 @@
                 </a:tc>
                 <a:extLst>
                   <a:ext uri="{0D108BD9-81ED-4DB2-BD59-A6C34878D82A}">
-                    <a16:rowId xmlns:a16="http://schemas.microsoft.com/office/drawing/2014/main" xmlns="" val="10002"/>
+                    <a16:rowId xmlns="" xmlns:a16="http://schemas.microsoft.com/office/drawing/2014/main" val="10002"/>
                   </a:ext>
                 </a:extLst>
               </a:tr>

</xml_diff>

<commit_message>
alteracao diagrama classe AC05, AC06
</commit_message>
<xml_diff>
--- a/ACS/AC5/LucasKurata_AC5.pptx
+++ b/ACS/AC5/LucasKurata_AC5.pptx
@@ -142,7 +142,7 @@
           <p:cNvPr id="2" name="Título 1">
             <a:extLst>
               <a:ext uri="{FF2B5EF4-FFF2-40B4-BE49-F238E27FC236}">
-                <a16:creationId xmlns:a16="http://schemas.microsoft.com/office/drawing/2014/main" xmlns="" id="{A3FA386C-FC2C-4F91-8EDD-329DDFB952ED}"/>
+                <a16:creationId xmlns:a16="http://schemas.microsoft.com/office/drawing/2014/main" id="{A3FA386C-FC2C-4F91-8EDD-329DDFB952ED}"/>
               </a:ext>
             </a:extLst>
           </p:cNvPr>
@@ -179,7 +179,7 @@
           <p:cNvPr id="3" name="Subtítulo 2">
             <a:extLst>
               <a:ext uri="{FF2B5EF4-FFF2-40B4-BE49-F238E27FC236}">
-                <a16:creationId xmlns:a16="http://schemas.microsoft.com/office/drawing/2014/main" xmlns="" id="{88334717-0707-4671-9E53-CA8F312ECBE2}"/>
+                <a16:creationId xmlns:a16="http://schemas.microsoft.com/office/drawing/2014/main" id="{88334717-0707-4671-9E53-CA8F312ECBE2}"/>
               </a:ext>
             </a:extLst>
           </p:cNvPr>
@@ -249,7 +249,7 @@
           <p:cNvPr id="4" name="Espaço Reservado para Data 3">
             <a:extLst>
               <a:ext uri="{FF2B5EF4-FFF2-40B4-BE49-F238E27FC236}">
-                <a16:creationId xmlns:a16="http://schemas.microsoft.com/office/drawing/2014/main" xmlns="" id="{CF361180-04D4-425A-AA1E-0C6CC32E4166}"/>
+                <a16:creationId xmlns:a16="http://schemas.microsoft.com/office/drawing/2014/main" id="{CF361180-04D4-425A-AA1E-0C6CC32E4166}"/>
               </a:ext>
             </a:extLst>
           </p:cNvPr>
@@ -267,7 +267,7 @@
           <a:p>
             <a:fld id="{3E91D812-1C9C-49AD-BEC0-7CCA4CF1B6CD}" type="datetimeFigureOut">
               <a:rPr lang="pt-BR" smtClean="0"/>
-              <a:t>16/05/2019</a:t>
+              <a:t>17/05/2019</a:t>
             </a:fld>
             <a:endParaRPr lang="pt-BR"/>
           </a:p>
@@ -278,7 +278,7 @@
           <p:cNvPr id="5" name="Espaço Reservado para Rodapé 4">
             <a:extLst>
               <a:ext uri="{FF2B5EF4-FFF2-40B4-BE49-F238E27FC236}">
-                <a16:creationId xmlns:a16="http://schemas.microsoft.com/office/drawing/2014/main" xmlns="" id="{9E5D2A2F-66DB-44BB-A434-3F8FA4870BBC}"/>
+                <a16:creationId xmlns:a16="http://schemas.microsoft.com/office/drawing/2014/main" id="{9E5D2A2F-66DB-44BB-A434-3F8FA4870BBC}"/>
               </a:ext>
             </a:extLst>
           </p:cNvPr>
@@ -303,7 +303,7 @@
           <p:cNvPr id="6" name="Espaço Reservado para Número de Slide 5">
             <a:extLst>
               <a:ext uri="{FF2B5EF4-FFF2-40B4-BE49-F238E27FC236}">
-                <a16:creationId xmlns:a16="http://schemas.microsoft.com/office/drawing/2014/main" xmlns="" id="{1597F922-6C87-42F1-9968-49603B048569}"/>
+                <a16:creationId xmlns:a16="http://schemas.microsoft.com/office/drawing/2014/main" id="{1597F922-6C87-42F1-9968-49603B048569}"/>
               </a:ext>
             </a:extLst>
           </p:cNvPr>
@@ -362,7 +362,7 @@
           <p:cNvPr id="2" name="Título 1">
             <a:extLst>
               <a:ext uri="{FF2B5EF4-FFF2-40B4-BE49-F238E27FC236}">
-                <a16:creationId xmlns:a16="http://schemas.microsoft.com/office/drawing/2014/main" xmlns="" id="{DD0F393C-C789-4212-A5C6-D8DB6BFF53A0}"/>
+                <a16:creationId xmlns:a16="http://schemas.microsoft.com/office/drawing/2014/main" id="{DD0F393C-C789-4212-A5C6-D8DB6BFF53A0}"/>
               </a:ext>
             </a:extLst>
           </p:cNvPr>
@@ -390,7 +390,7 @@
           <p:cNvPr id="3" name="Espaço Reservado para Texto Vertical 2">
             <a:extLst>
               <a:ext uri="{FF2B5EF4-FFF2-40B4-BE49-F238E27FC236}">
-                <a16:creationId xmlns:a16="http://schemas.microsoft.com/office/drawing/2014/main" xmlns="" id="{42A59C34-51B3-4756-87AF-3217C54F5D3D}"/>
+                <a16:creationId xmlns:a16="http://schemas.microsoft.com/office/drawing/2014/main" id="{42A59C34-51B3-4756-87AF-3217C54F5D3D}"/>
               </a:ext>
             </a:extLst>
           </p:cNvPr>
@@ -447,7 +447,7 @@
           <p:cNvPr id="4" name="Espaço Reservado para Data 3">
             <a:extLst>
               <a:ext uri="{FF2B5EF4-FFF2-40B4-BE49-F238E27FC236}">
-                <a16:creationId xmlns:a16="http://schemas.microsoft.com/office/drawing/2014/main" xmlns="" id="{0DCD7C2E-CD26-46F7-AB44-71F874C645CA}"/>
+                <a16:creationId xmlns:a16="http://schemas.microsoft.com/office/drawing/2014/main" id="{0DCD7C2E-CD26-46F7-AB44-71F874C645CA}"/>
               </a:ext>
             </a:extLst>
           </p:cNvPr>
@@ -465,7 +465,7 @@
           <a:p>
             <a:fld id="{3E91D812-1C9C-49AD-BEC0-7CCA4CF1B6CD}" type="datetimeFigureOut">
               <a:rPr lang="pt-BR" smtClean="0"/>
-              <a:t>16/05/2019</a:t>
+              <a:t>17/05/2019</a:t>
             </a:fld>
             <a:endParaRPr lang="pt-BR"/>
           </a:p>
@@ -476,7 +476,7 @@
           <p:cNvPr id="5" name="Espaço Reservado para Rodapé 4">
             <a:extLst>
               <a:ext uri="{FF2B5EF4-FFF2-40B4-BE49-F238E27FC236}">
-                <a16:creationId xmlns:a16="http://schemas.microsoft.com/office/drawing/2014/main" xmlns="" id="{6B799F0C-0377-4E71-BE6C-C38FE6849EF3}"/>
+                <a16:creationId xmlns:a16="http://schemas.microsoft.com/office/drawing/2014/main" id="{6B799F0C-0377-4E71-BE6C-C38FE6849EF3}"/>
               </a:ext>
             </a:extLst>
           </p:cNvPr>
@@ -501,7 +501,7 @@
           <p:cNvPr id="6" name="Espaço Reservado para Número de Slide 5">
             <a:extLst>
               <a:ext uri="{FF2B5EF4-FFF2-40B4-BE49-F238E27FC236}">
-                <a16:creationId xmlns:a16="http://schemas.microsoft.com/office/drawing/2014/main" xmlns="" id="{D2CD5EFF-85C8-475F-9877-E069D843C437}"/>
+                <a16:creationId xmlns:a16="http://schemas.microsoft.com/office/drawing/2014/main" id="{D2CD5EFF-85C8-475F-9877-E069D843C437}"/>
               </a:ext>
             </a:extLst>
           </p:cNvPr>
@@ -560,7 +560,7 @@
           <p:cNvPr id="2" name="Título Vertical 1">
             <a:extLst>
               <a:ext uri="{FF2B5EF4-FFF2-40B4-BE49-F238E27FC236}">
-                <a16:creationId xmlns:a16="http://schemas.microsoft.com/office/drawing/2014/main" xmlns="" id="{41C49E24-32C7-4697-BED4-9F6843D789A8}"/>
+                <a16:creationId xmlns:a16="http://schemas.microsoft.com/office/drawing/2014/main" id="{41C49E24-32C7-4697-BED4-9F6843D789A8}"/>
               </a:ext>
             </a:extLst>
           </p:cNvPr>
@@ -593,7 +593,7 @@
           <p:cNvPr id="3" name="Espaço Reservado para Texto Vertical 2">
             <a:extLst>
               <a:ext uri="{FF2B5EF4-FFF2-40B4-BE49-F238E27FC236}">
-                <a16:creationId xmlns:a16="http://schemas.microsoft.com/office/drawing/2014/main" xmlns="" id="{872B211D-6B0E-4323-800F-98CF713C0A8A}"/>
+                <a16:creationId xmlns:a16="http://schemas.microsoft.com/office/drawing/2014/main" id="{872B211D-6B0E-4323-800F-98CF713C0A8A}"/>
               </a:ext>
             </a:extLst>
           </p:cNvPr>
@@ -655,7 +655,7 @@
           <p:cNvPr id="4" name="Espaço Reservado para Data 3">
             <a:extLst>
               <a:ext uri="{FF2B5EF4-FFF2-40B4-BE49-F238E27FC236}">
-                <a16:creationId xmlns:a16="http://schemas.microsoft.com/office/drawing/2014/main" xmlns="" id="{919FC4CF-4B3C-4501-B1FA-601DF2074195}"/>
+                <a16:creationId xmlns:a16="http://schemas.microsoft.com/office/drawing/2014/main" id="{919FC4CF-4B3C-4501-B1FA-601DF2074195}"/>
               </a:ext>
             </a:extLst>
           </p:cNvPr>
@@ -673,7 +673,7 @@
           <a:p>
             <a:fld id="{3E91D812-1C9C-49AD-BEC0-7CCA4CF1B6CD}" type="datetimeFigureOut">
               <a:rPr lang="pt-BR" smtClean="0"/>
-              <a:t>16/05/2019</a:t>
+              <a:t>17/05/2019</a:t>
             </a:fld>
             <a:endParaRPr lang="pt-BR"/>
           </a:p>
@@ -684,7 +684,7 @@
           <p:cNvPr id="5" name="Espaço Reservado para Rodapé 4">
             <a:extLst>
               <a:ext uri="{FF2B5EF4-FFF2-40B4-BE49-F238E27FC236}">
-                <a16:creationId xmlns:a16="http://schemas.microsoft.com/office/drawing/2014/main" xmlns="" id="{E7E84B59-1BE2-40E5-A53A-8F4A019CDF02}"/>
+                <a16:creationId xmlns:a16="http://schemas.microsoft.com/office/drawing/2014/main" id="{E7E84B59-1BE2-40E5-A53A-8F4A019CDF02}"/>
               </a:ext>
             </a:extLst>
           </p:cNvPr>
@@ -709,7 +709,7 @@
           <p:cNvPr id="6" name="Espaço Reservado para Número de Slide 5">
             <a:extLst>
               <a:ext uri="{FF2B5EF4-FFF2-40B4-BE49-F238E27FC236}">
-                <a16:creationId xmlns:a16="http://schemas.microsoft.com/office/drawing/2014/main" xmlns="" id="{659556BA-7E2A-4355-A4D0-941FDC399882}"/>
+                <a16:creationId xmlns:a16="http://schemas.microsoft.com/office/drawing/2014/main" id="{659556BA-7E2A-4355-A4D0-941FDC399882}"/>
               </a:ext>
             </a:extLst>
           </p:cNvPr>
@@ -768,7 +768,7 @@
           <p:cNvPr id="2" name="Título 1">
             <a:extLst>
               <a:ext uri="{FF2B5EF4-FFF2-40B4-BE49-F238E27FC236}">
-                <a16:creationId xmlns:a16="http://schemas.microsoft.com/office/drawing/2014/main" xmlns="" id="{06D47412-5BFC-4445-817D-756889866BAC}"/>
+                <a16:creationId xmlns:a16="http://schemas.microsoft.com/office/drawing/2014/main" id="{06D47412-5BFC-4445-817D-756889866BAC}"/>
               </a:ext>
             </a:extLst>
           </p:cNvPr>
@@ -796,7 +796,7 @@
           <p:cNvPr id="3" name="Espaço Reservado para Conteúdo 2">
             <a:extLst>
               <a:ext uri="{FF2B5EF4-FFF2-40B4-BE49-F238E27FC236}">
-                <a16:creationId xmlns:a16="http://schemas.microsoft.com/office/drawing/2014/main" xmlns="" id="{9B1EA361-3043-48FA-A976-50610F902D01}"/>
+                <a16:creationId xmlns:a16="http://schemas.microsoft.com/office/drawing/2014/main" id="{9B1EA361-3043-48FA-A976-50610F902D01}"/>
               </a:ext>
             </a:extLst>
           </p:cNvPr>
@@ -853,7 +853,7 @@
           <p:cNvPr id="4" name="Espaço Reservado para Data 3">
             <a:extLst>
               <a:ext uri="{FF2B5EF4-FFF2-40B4-BE49-F238E27FC236}">
-                <a16:creationId xmlns:a16="http://schemas.microsoft.com/office/drawing/2014/main" xmlns="" id="{F3A37D03-3B16-49F4-912E-4DB23F09F45A}"/>
+                <a16:creationId xmlns:a16="http://schemas.microsoft.com/office/drawing/2014/main" id="{F3A37D03-3B16-49F4-912E-4DB23F09F45A}"/>
               </a:ext>
             </a:extLst>
           </p:cNvPr>
@@ -871,7 +871,7 @@
           <a:p>
             <a:fld id="{3E91D812-1C9C-49AD-BEC0-7CCA4CF1B6CD}" type="datetimeFigureOut">
               <a:rPr lang="pt-BR" smtClean="0"/>
-              <a:t>16/05/2019</a:t>
+              <a:t>17/05/2019</a:t>
             </a:fld>
             <a:endParaRPr lang="pt-BR"/>
           </a:p>
@@ -882,7 +882,7 @@
           <p:cNvPr id="5" name="Espaço Reservado para Rodapé 4">
             <a:extLst>
               <a:ext uri="{FF2B5EF4-FFF2-40B4-BE49-F238E27FC236}">
-                <a16:creationId xmlns:a16="http://schemas.microsoft.com/office/drawing/2014/main" xmlns="" id="{B9E0AB52-F869-411D-9E02-B8676C1A1114}"/>
+                <a16:creationId xmlns:a16="http://schemas.microsoft.com/office/drawing/2014/main" id="{B9E0AB52-F869-411D-9E02-B8676C1A1114}"/>
               </a:ext>
             </a:extLst>
           </p:cNvPr>
@@ -907,7 +907,7 @@
           <p:cNvPr id="6" name="Espaço Reservado para Número de Slide 5">
             <a:extLst>
               <a:ext uri="{FF2B5EF4-FFF2-40B4-BE49-F238E27FC236}">
-                <a16:creationId xmlns:a16="http://schemas.microsoft.com/office/drawing/2014/main" xmlns="" id="{4D01CB17-ECE2-4C3E-8E1F-F9979387AD35}"/>
+                <a16:creationId xmlns:a16="http://schemas.microsoft.com/office/drawing/2014/main" id="{4D01CB17-ECE2-4C3E-8E1F-F9979387AD35}"/>
               </a:ext>
             </a:extLst>
           </p:cNvPr>
@@ -966,7 +966,7 @@
           <p:cNvPr id="2" name="Título 1">
             <a:extLst>
               <a:ext uri="{FF2B5EF4-FFF2-40B4-BE49-F238E27FC236}">
-                <a16:creationId xmlns:a16="http://schemas.microsoft.com/office/drawing/2014/main" xmlns="" id="{D8C6A54B-196E-4888-BD13-8C0CCDB425CC}"/>
+                <a16:creationId xmlns:a16="http://schemas.microsoft.com/office/drawing/2014/main" id="{D8C6A54B-196E-4888-BD13-8C0CCDB425CC}"/>
               </a:ext>
             </a:extLst>
           </p:cNvPr>
@@ -1003,7 +1003,7 @@
           <p:cNvPr id="3" name="Espaço Reservado para Texto 2">
             <a:extLst>
               <a:ext uri="{FF2B5EF4-FFF2-40B4-BE49-F238E27FC236}">
-                <a16:creationId xmlns:a16="http://schemas.microsoft.com/office/drawing/2014/main" xmlns="" id="{F7E9788F-4A31-4635-B629-F6DA3C1AEF9E}"/>
+                <a16:creationId xmlns:a16="http://schemas.microsoft.com/office/drawing/2014/main" id="{F7E9788F-4A31-4635-B629-F6DA3C1AEF9E}"/>
               </a:ext>
             </a:extLst>
           </p:cNvPr>
@@ -1128,7 +1128,7 @@
           <p:cNvPr id="4" name="Espaço Reservado para Data 3">
             <a:extLst>
               <a:ext uri="{FF2B5EF4-FFF2-40B4-BE49-F238E27FC236}">
-                <a16:creationId xmlns:a16="http://schemas.microsoft.com/office/drawing/2014/main" xmlns="" id="{A2D3C766-D32A-41B9-B861-33B0C80580EB}"/>
+                <a16:creationId xmlns:a16="http://schemas.microsoft.com/office/drawing/2014/main" id="{A2D3C766-D32A-41B9-B861-33B0C80580EB}"/>
               </a:ext>
             </a:extLst>
           </p:cNvPr>
@@ -1146,7 +1146,7 @@
           <a:p>
             <a:fld id="{3E91D812-1C9C-49AD-BEC0-7CCA4CF1B6CD}" type="datetimeFigureOut">
               <a:rPr lang="pt-BR" smtClean="0"/>
-              <a:t>16/05/2019</a:t>
+              <a:t>17/05/2019</a:t>
             </a:fld>
             <a:endParaRPr lang="pt-BR"/>
           </a:p>
@@ -1157,7 +1157,7 @@
           <p:cNvPr id="5" name="Espaço Reservado para Rodapé 4">
             <a:extLst>
               <a:ext uri="{FF2B5EF4-FFF2-40B4-BE49-F238E27FC236}">
-                <a16:creationId xmlns:a16="http://schemas.microsoft.com/office/drawing/2014/main" xmlns="" id="{6BE45E65-65DC-46E0-8C9E-BCD986E17E8D}"/>
+                <a16:creationId xmlns:a16="http://schemas.microsoft.com/office/drawing/2014/main" id="{6BE45E65-65DC-46E0-8C9E-BCD986E17E8D}"/>
               </a:ext>
             </a:extLst>
           </p:cNvPr>
@@ -1182,7 +1182,7 @@
           <p:cNvPr id="6" name="Espaço Reservado para Número de Slide 5">
             <a:extLst>
               <a:ext uri="{FF2B5EF4-FFF2-40B4-BE49-F238E27FC236}">
-                <a16:creationId xmlns:a16="http://schemas.microsoft.com/office/drawing/2014/main" xmlns="" id="{B0BB2C9E-DDD5-481A-99A8-FBC3C3248267}"/>
+                <a16:creationId xmlns:a16="http://schemas.microsoft.com/office/drawing/2014/main" id="{B0BB2C9E-DDD5-481A-99A8-FBC3C3248267}"/>
               </a:ext>
             </a:extLst>
           </p:cNvPr>
@@ -1241,7 +1241,7 @@
           <p:cNvPr id="2" name="Título 1">
             <a:extLst>
               <a:ext uri="{FF2B5EF4-FFF2-40B4-BE49-F238E27FC236}">
-                <a16:creationId xmlns:a16="http://schemas.microsoft.com/office/drawing/2014/main" xmlns="" id="{9F635F1B-99A4-4AA6-809A-04F117FE0F85}"/>
+                <a16:creationId xmlns:a16="http://schemas.microsoft.com/office/drawing/2014/main" id="{9F635F1B-99A4-4AA6-809A-04F117FE0F85}"/>
               </a:ext>
             </a:extLst>
           </p:cNvPr>
@@ -1269,7 +1269,7 @@
           <p:cNvPr id="3" name="Espaço Reservado para Conteúdo 2">
             <a:extLst>
               <a:ext uri="{FF2B5EF4-FFF2-40B4-BE49-F238E27FC236}">
-                <a16:creationId xmlns:a16="http://schemas.microsoft.com/office/drawing/2014/main" xmlns="" id="{00870D55-C2C1-4214-81CF-D55188287C00}"/>
+                <a16:creationId xmlns:a16="http://schemas.microsoft.com/office/drawing/2014/main" id="{00870D55-C2C1-4214-81CF-D55188287C00}"/>
               </a:ext>
             </a:extLst>
           </p:cNvPr>
@@ -1331,7 +1331,7 @@
           <p:cNvPr id="4" name="Espaço Reservado para Conteúdo 3">
             <a:extLst>
               <a:ext uri="{FF2B5EF4-FFF2-40B4-BE49-F238E27FC236}">
-                <a16:creationId xmlns:a16="http://schemas.microsoft.com/office/drawing/2014/main" xmlns="" id="{1C85CA82-2F6C-4771-81A5-39E45BFF2D3F}"/>
+                <a16:creationId xmlns:a16="http://schemas.microsoft.com/office/drawing/2014/main" id="{1C85CA82-2F6C-4771-81A5-39E45BFF2D3F}"/>
               </a:ext>
             </a:extLst>
           </p:cNvPr>
@@ -1393,7 +1393,7 @@
           <p:cNvPr id="5" name="Espaço Reservado para Data 4">
             <a:extLst>
               <a:ext uri="{FF2B5EF4-FFF2-40B4-BE49-F238E27FC236}">
-                <a16:creationId xmlns:a16="http://schemas.microsoft.com/office/drawing/2014/main" xmlns="" id="{A75A1F48-CED4-4ABD-BD3D-0E8DB82115CB}"/>
+                <a16:creationId xmlns:a16="http://schemas.microsoft.com/office/drawing/2014/main" id="{A75A1F48-CED4-4ABD-BD3D-0E8DB82115CB}"/>
               </a:ext>
             </a:extLst>
           </p:cNvPr>
@@ -1411,7 +1411,7 @@
           <a:p>
             <a:fld id="{3E91D812-1C9C-49AD-BEC0-7CCA4CF1B6CD}" type="datetimeFigureOut">
               <a:rPr lang="pt-BR" smtClean="0"/>
-              <a:t>16/05/2019</a:t>
+              <a:t>17/05/2019</a:t>
             </a:fld>
             <a:endParaRPr lang="pt-BR"/>
           </a:p>
@@ -1422,7 +1422,7 @@
           <p:cNvPr id="6" name="Espaço Reservado para Rodapé 5">
             <a:extLst>
               <a:ext uri="{FF2B5EF4-FFF2-40B4-BE49-F238E27FC236}">
-                <a16:creationId xmlns:a16="http://schemas.microsoft.com/office/drawing/2014/main" xmlns="" id="{41B1FB1A-14CC-4480-A1B9-1ED302689CFC}"/>
+                <a16:creationId xmlns:a16="http://schemas.microsoft.com/office/drawing/2014/main" id="{41B1FB1A-14CC-4480-A1B9-1ED302689CFC}"/>
               </a:ext>
             </a:extLst>
           </p:cNvPr>
@@ -1447,7 +1447,7 @@
           <p:cNvPr id="7" name="Espaço Reservado para Número de Slide 6">
             <a:extLst>
               <a:ext uri="{FF2B5EF4-FFF2-40B4-BE49-F238E27FC236}">
-                <a16:creationId xmlns:a16="http://schemas.microsoft.com/office/drawing/2014/main" xmlns="" id="{E2005BA8-4851-4BC5-9981-0FD5DC8BBE35}"/>
+                <a16:creationId xmlns:a16="http://schemas.microsoft.com/office/drawing/2014/main" id="{E2005BA8-4851-4BC5-9981-0FD5DC8BBE35}"/>
               </a:ext>
             </a:extLst>
           </p:cNvPr>
@@ -1506,7 +1506,7 @@
           <p:cNvPr id="2" name="Título 1">
             <a:extLst>
               <a:ext uri="{FF2B5EF4-FFF2-40B4-BE49-F238E27FC236}">
-                <a16:creationId xmlns:a16="http://schemas.microsoft.com/office/drawing/2014/main" xmlns="" id="{FCCEAE6E-0DB6-4DD6-9E8D-942971519C0C}"/>
+                <a16:creationId xmlns:a16="http://schemas.microsoft.com/office/drawing/2014/main" id="{FCCEAE6E-0DB6-4DD6-9E8D-942971519C0C}"/>
               </a:ext>
             </a:extLst>
           </p:cNvPr>
@@ -1539,7 +1539,7 @@
           <p:cNvPr id="3" name="Espaço Reservado para Texto 2">
             <a:extLst>
               <a:ext uri="{FF2B5EF4-FFF2-40B4-BE49-F238E27FC236}">
-                <a16:creationId xmlns:a16="http://schemas.microsoft.com/office/drawing/2014/main" xmlns="" id="{3E31BC1A-4AE3-4AF3-9A27-686764CB6BD7}"/>
+                <a16:creationId xmlns:a16="http://schemas.microsoft.com/office/drawing/2014/main" id="{3E31BC1A-4AE3-4AF3-9A27-686764CB6BD7}"/>
               </a:ext>
             </a:extLst>
           </p:cNvPr>
@@ -1610,7 +1610,7 @@
           <p:cNvPr id="4" name="Espaço Reservado para Conteúdo 3">
             <a:extLst>
               <a:ext uri="{FF2B5EF4-FFF2-40B4-BE49-F238E27FC236}">
-                <a16:creationId xmlns:a16="http://schemas.microsoft.com/office/drawing/2014/main" xmlns="" id="{B87E778A-501C-47BA-86D1-EF8A80494C65}"/>
+                <a16:creationId xmlns:a16="http://schemas.microsoft.com/office/drawing/2014/main" id="{B87E778A-501C-47BA-86D1-EF8A80494C65}"/>
               </a:ext>
             </a:extLst>
           </p:cNvPr>
@@ -1672,7 +1672,7 @@
           <p:cNvPr id="5" name="Espaço Reservado para Texto 4">
             <a:extLst>
               <a:ext uri="{FF2B5EF4-FFF2-40B4-BE49-F238E27FC236}">
-                <a16:creationId xmlns:a16="http://schemas.microsoft.com/office/drawing/2014/main" xmlns="" id="{9E1B51EB-499C-460A-9A02-A83AADB4A876}"/>
+                <a16:creationId xmlns:a16="http://schemas.microsoft.com/office/drawing/2014/main" id="{9E1B51EB-499C-460A-9A02-A83AADB4A876}"/>
               </a:ext>
             </a:extLst>
           </p:cNvPr>
@@ -1743,7 +1743,7 @@
           <p:cNvPr id="6" name="Espaço Reservado para Conteúdo 5">
             <a:extLst>
               <a:ext uri="{FF2B5EF4-FFF2-40B4-BE49-F238E27FC236}">
-                <a16:creationId xmlns:a16="http://schemas.microsoft.com/office/drawing/2014/main" xmlns="" id="{4FF8E80F-62A9-424B-B5DC-949D412B1284}"/>
+                <a16:creationId xmlns:a16="http://schemas.microsoft.com/office/drawing/2014/main" id="{4FF8E80F-62A9-424B-B5DC-949D412B1284}"/>
               </a:ext>
             </a:extLst>
           </p:cNvPr>
@@ -1805,7 +1805,7 @@
           <p:cNvPr id="7" name="Espaço Reservado para Data 6">
             <a:extLst>
               <a:ext uri="{FF2B5EF4-FFF2-40B4-BE49-F238E27FC236}">
-                <a16:creationId xmlns:a16="http://schemas.microsoft.com/office/drawing/2014/main" xmlns="" id="{93C511C0-2CCC-4949-89B0-9382BE844DF2}"/>
+                <a16:creationId xmlns:a16="http://schemas.microsoft.com/office/drawing/2014/main" id="{93C511C0-2CCC-4949-89B0-9382BE844DF2}"/>
               </a:ext>
             </a:extLst>
           </p:cNvPr>
@@ -1823,7 +1823,7 @@
           <a:p>
             <a:fld id="{3E91D812-1C9C-49AD-BEC0-7CCA4CF1B6CD}" type="datetimeFigureOut">
               <a:rPr lang="pt-BR" smtClean="0"/>
-              <a:t>16/05/2019</a:t>
+              <a:t>17/05/2019</a:t>
             </a:fld>
             <a:endParaRPr lang="pt-BR"/>
           </a:p>
@@ -1834,7 +1834,7 @@
           <p:cNvPr id="8" name="Espaço Reservado para Rodapé 7">
             <a:extLst>
               <a:ext uri="{FF2B5EF4-FFF2-40B4-BE49-F238E27FC236}">
-                <a16:creationId xmlns:a16="http://schemas.microsoft.com/office/drawing/2014/main" xmlns="" id="{0FC02D5D-7FD1-4942-9A8C-A7BB6DD1C647}"/>
+                <a16:creationId xmlns:a16="http://schemas.microsoft.com/office/drawing/2014/main" id="{0FC02D5D-7FD1-4942-9A8C-A7BB6DD1C647}"/>
               </a:ext>
             </a:extLst>
           </p:cNvPr>
@@ -1859,7 +1859,7 @@
           <p:cNvPr id="9" name="Espaço Reservado para Número de Slide 8">
             <a:extLst>
               <a:ext uri="{FF2B5EF4-FFF2-40B4-BE49-F238E27FC236}">
-                <a16:creationId xmlns:a16="http://schemas.microsoft.com/office/drawing/2014/main" xmlns="" id="{C4BBA6A6-6350-4217-A848-9C79957CA9DB}"/>
+                <a16:creationId xmlns:a16="http://schemas.microsoft.com/office/drawing/2014/main" id="{C4BBA6A6-6350-4217-A848-9C79957CA9DB}"/>
               </a:ext>
             </a:extLst>
           </p:cNvPr>
@@ -1918,7 +1918,7 @@
           <p:cNvPr id="2" name="Título 1">
             <a:extLst>
               <a:ext uri="{FF2B5EF4-FFF2-40B4-BE49-F238E27FC236}">
-                <a16:creationId xmlns:a16="http://schemas.microsoft.com/office/drawing/2014/main" xmlns="" id="{FFE4832D-B170-4A1C-B7C1-67FC0B4EBDD8}"/>
+                <a16:creationId xmlns:a16="http://schemas.microsoft.com/office/drawing/2014/main" id="{FFE4832D-B170-4A1C-B7C1-67FC0B4EBDD8}"/>
               </a:ext>
             </a:extLst>
           </p:cNvPr>
@@ -1946,7 +1946,7 @@
           <p:cNvPr id="3" name="Espaço Reservado para Data 2">
             <a:extLst>
               <a:ext uri="{FF2B5EF4-FFF2-40B4-BE49-F238E27FC236}">
-                <a16:creationId xmlns:a16="http://schemas.microsoft.com/office/drawing/2014/main" xmlns="" id="{23B03EF2-056C-442B-A1CA-38A36E89F4B6}"/>
+                <a16:creationId xmlns:a16="http://schemas.microsoft.com/office/drawing/2014/main" id="{23B03EF2-056C-442B-A1CA-38A36E89F4B6}"/>
               </a:ext>
             </a:extLst>
           </p:cNvPr>
@@ -1964,7 +1964,7 @@
           <a:p>
             <a:fld id="{3E91D812-1C9C-49AD-BEC0-7CCA4CF1B6CD}" type="datetimeFigureOut">
               <a:rPr lang="pt-BR" smtClean="0"/>
-              <a:t>16/05/2019</a:t>
+              <a:t>17/05/2019</a:t>
             </a:fld>
             <a:endParaRPr lang="pt-BR"/>
           </a:p>
@@ -1975,7 +1975,7 @@
           <p:cNvPr id="4" name="Espaço Reservado para Rodapé 3">
             <a:extLst>
               <a:ext uri="{FF2B5EF4-FFF2-40B4-BE49-F238E27FC236}">
-                <a16:creationId xmlns:a16="http://schemas.microsoft.com/office/drawing/2014/main" xmlns="" id="{216C9F26-7D01-4188-94C7-299B1823833F}"/>
+                <a16:creationId xmlns:a16="http://schemas.microsoft.com/office/drawing/2014/main" id="{216C9F26-7D01-4188-94C7-299B1823833F}"/>
               </a:ext>
             </a:extLst>
           </p:cNvPr>
@@ -2000,7 +2000,7 @@
           <p:cNvPr id="5" name="Espaço Reservado para Número de Slide 4">
             <a:extLst>
               <a:ext uri="{FF2B5EF4-FFF2-40B4-BE49-F238E27FC236}">
-                <a16:creationId xmlns:a16="http://schemas.microsoft.com/office/drawing/2014/main" xmlns="" id="{BBC8A12A-0824-4417-8A2C-13955BCA0475}"/>
+                <a16:creationId xmlns:a16="http://schemas.microsoft.com/office/drawing/2014/main" id="{BBC8A12A-0824-4417-8A2C-13955BCA0475}"/>
               </a:ext>
             </a:extLst>
           </p:cNvPr>
@@ -2059,7 +2059,7 @@
           <p:cNvPr id="2" name="Espaço Reservado para Data 1">
             <a:extLst>
               <a:ext uri="{FF2B5EF4-FFF2-40B4-BE49-F238E27FC236}">
-                <a16:creationId xmlns:a16="http://schemas.microsoft.com/office/drawing/2014/main" xmlns="" id="{746D3D2F-36A4-4654-BC90-D08B7C97D78B}"/>
+                <a16:creationId xmlns:a16="http://schemas.microsoft.com/office/drawing/2014/main" id="{746D3D2F-36A4-4654-BC90-D08B7C97D78B}"/>
               </a:ext>
             </a:extLst>
           </p:cNvPr>
@@ -2077,7 +2077,7 @@
           <a:p>
             <a:fld id="{3E91D812-1C9C-49AD-BEC0-7CCA4CF1B6CD}" type="datetimeFigureOut">
               <a:rPr lang="pt-BR" smtClean="0"/>
-              <a:t>16/05/2019</a:t>
+              <a:t>17/05/2019</a:t>
             </a:fld>
             <a:endParaRPr lang="pt-BR"/>
           </a:p>
@@ -2088,7 +2088,7 @@
           <p:cNvPr id="3" name="Espaço Reservado para Rodapé 2">
             <a:extLst>
               <a:ext uri="{FF2B5EF4-FFF2-40B4-BE49-F238E27FC236}">
-                <a16:creationId xmlns:a16="http://schemas.microsoft.com/office/drawing/2014/main" xmlns="" id="{305045F9-28E0-4E82-A36C-B86C375E66EB}"/>
+                <a16:creationId xmlns:a16="http://schemas.microsoft.com/office/drawing/2014/main" id="{305045F9-28E0-4E82-A36C-B86C375E66EB}"/>
               </a:ext>
             </a:extLst>
           </p:cNvPr>
@@ -2113,7 +2113,7 @@
           <p:cNvPr id="4" name="Espaço Reservado para Número de Slide 3">
             <a:extLst>
               <a:ext uri="{FF2B5EF4-FFF2-40B4-BE49-F238E27FC236}">
-                <a16:creationId xmlns:a16="http://schemas.microsoft.com/office/drawing/2014/main" xmlns="" id="{7AAE7D08-DEC1-4182-A1BC-4B0B3E0138E3}"/>
+                <a16:creationId xmlns:a16="http://schemas.microsoft.com/office/drawing/2014/main" id="{7AAE7D08-DEC1-4182-A1BC-4B0B3E0138E3}"/>
               </a:ext>
             </a:extLst>
           </p:cNvPr>
@@ -2172,7 +2172,7 @@
           <p:cNvPr id="2" name="Título 1">
             <a:extLst>
               <a:ext uri="{FF2B5EF4-FFF2-40B4-BE49-F238E27FC236}">
-                <a16:creationId xmlns:a16="http://schemas.microsoft.com/office/drawing/2014/main" xmlns="" id="{14488850-8AE5-48F5-8E5C-92AA64BE2B34}"/>
+                <a16:creationId xmlns:a16="http://schemas.microsoft.com/office/drawing/2014/main" id="{14488850-8AE5-48F5-8E5C-92AA64BE2B34}"/>
               </a:ext>
             </a:extLst>
           </p:cNvPr>
@@ -2209,7 +2209,7 @@
           <p:cNvPr id="3" name="Espaço Reservado para Conteúdo 2">
             <a:extLst>
               <a:ext uri="{FF2B5EF4-FFF2-40B4-BE49-F238E27FC236}">
-                <a16:creationId xmlns:a16="http://schemas.microsoft.com/office/drawing/2014/main" xmlns="" id="{F30D7389-91C0-40F6-8EB5-D0F3EC595EF2}"/>
+                <a16:creationId xmlns:a16="http://schemas.microsoft.com/office/drawing/2014/main" id="{F30D7389-91C0-40F6-8EB5-D0F3EC595EF2}"/>
               </a:ext>
             </a:extLst>
           </p:cNvPr>
@@ -2299,7 +2299,7 @@
           <p:cNvPr id="4" name="Espaço Reservado para Texto 3">
             <a:extLst>
               <a:ext uri="{FF2B5EF4-FFF2-40B4-BE49-F238E27FC236}">
-                <a16:creationId xmlns:a16="http://schemas.microsoft.com/office/drawing/2014/main" xmlns="" id="{69F5104B-587D-44FD-9EEC-494E3BC3E8E9}"/>
+                <a16:creationId xmlns:a16="http://schemas.microsoft.com/office/drawing/2014/main" id="{69F5104B-587D-44FD-9EEC-494E3BC3E8E9}"/>
               </a:ext>
             </a:extLst>
           </p:cNvPr>
@@ -2370,7 +2370,7 @@
           <p:cNvPr id="5" name="Espaço Reservado para Data 4">
             <a:extLst>
               <a:ext uri="{FF2B5EF4-FFF2-40B4-BE49-F238E27FC236}">
-                <a16:creationId xmlns:a16="http://schemas.microsoft.com/office/drawing/2014/main" xmlns="" id="{379D1885-6D8A-49DA-AFE4-999D64EAFF67}"/>
+                <a16:creationId xmlns:a16="http://schemas.microsoft.com/office/drawing/2014/main" id="{379D1885-6D8A-49DA-AFE4-999D64EAFF67}"/>
               </a:ext>
             </a:extLst>
           </p:cNvPr>
@@ -2388,7 +2388,7 @@
           <a:p>
             <a:fld id="{3E91D812-1C9C-49AD-BEC0-7CCA4CF1B6CD}" type="datetimeFigureOut">
               <a:rPr lang="pt-BR" smtClean="0"/>
-              <a:t>16/05/2019</a:t>
+              <a:t>17/05/2019</a:t>
             </a:fld>
             <a:endParaRPr lang="pt-BR"/>
           </a:p>
@@ -2399,7 +2399,7 @@
           <p:cNvPr id="6" name="Espaço Reservado para Rodapé 5">
             <a:extLst>
               <a:ext uri="{FF2B5EF4-FFF2-40B4-BE49-F238E27FC236}">
-                <a16:creationId xmlns:a16="http://schemas.microsoft.com/office/drawing/2014/main" xmlns="" id="{D6AA084E-976C-4578-A753-E4B2128A8207}"/>
+                <a16:creationId xmlns:a16="http://schemas.microsoft.com/office/drawing/2014/main" id="{D6AA084E-976C-4578-A753-E4B2128A8207}"/>
               </a:ext>
             </a:extLst>
           </p:cNvPr>
@@ -2424,7 +2424,7 @@
           <p:cNvPr id="7" name="Espaço Reservado para Número de Slide 6">
             <a:extLst>
               <a:ext uri="{FF2B5EF4-FFF2-40B4-BE49-F238E27FC236}">
-                <a16:creationId xmlns:a16="http://schemas.microsoft.com/office/drawing/2014/main" xmlns="" id="{5303A1E9-9AE5-42C1-B110-7434D278DB50}"/>
+                <a16:creationId xmlns:a16="http://schemas.microsoft.com/office/drawing/2014/main" id="{5303A1E9-9AE5-42C1-B110-7434D278DB50}"/>
               </a:ext>
             </a:extLst>
           </p:cNvPr>
@@ -2483,7 +2483,7 @@
           <p:cNvPr id="2" name="Título 1">
             <a:extLst>
               <a:ext uri="{FF2B5EF4-FFF2-40B4-BE49-F238E27FC236}">
-                <a16:creationId xmlns:a16="http://schemas.microsoft.com/office/drawing/2014/main" xmlns="" id="{C7DDD54D-A15E-4EA2-A292-D6A1C4C82836}"/>
+                <a16:creationId xmlns:a16="http://schemas.microsoft.com/office/drawing/2014/main" id="{C7DDD54D-A15E-4EA2-A292-D6A1C4C82836}"/>
               </a:ext>
             </a:extLst>
           </p:cNvPr>
@@ -2520,7 +2520,7 @@
           <p:cNvPr id="3" name="Espaço Reservado para Imagem 2">
             <a:extLst>
               <a:ext uri="{FF2B5EF4-FFF2-40B4-BE49-F238E27FC236}">
-                <a16:creationId xmlns:a16="http://schemas.microsoft.com/office/drawing/2014/main" xmlns="" id="{838BA2FE-0799-4382-AB5A-0467ECC3B9E4}"/>
+                <a16:creationId xmlns:a16="http://schemas.microsoft.com/office/drawing/2014/main" id="{838BA2FE-0799-4382-AB5A-0467ECC3B9E4}"/>
               </a:ext>
             </a:extLst>
           </p:cNvPr>
@@ -2587,7 +2587,7 @@
           <p:cNvPr id="4" name="Espaço Reservado para Texto 3">
             <a:extLst>
               <a:ext uri="{FF2B5EF4-FFF2-40B4-BE49-F238E27FC236}">
-                <a16:creationId xmlns:a16="http://schemas.microsoft.com/office/drawing/2014/main" xmlns="" id="{81CF12AD-6D7B-40B1-A922-1E4E17DA7C18}"/>
+                <a16:creationId xmlns:a16="http://schemas.microsoft.com/office/drawing/2014/main" id="{81CF12AD-6D7B-40B1-A922-1E4E17DA7C18}"/>
               </a:ext>
             </a:extLst>
           </p:cNvPr>
@@ -2658,7 +2658,7 @@
           <p:cNvPr id="5" name="Espaço Reservado para Data 4">
             <a:extLst>
               <a:ext uri="{FF2B5EF4-FFF2-40B4-BE49-F238E27FC236}">
-                <a16:creationId xmlns:a16="http://schemas.microsoft.com/office/drawing/2014/main" xmlns="" id="{A9D19DF7-4077-42CA-9EB5-A03CCC04776C}"/>
+                <a16:creationId xmlns:a16="http://schemas.microsoft.com/office/drawing/2014/main" id="{A9D19DF7-4077-42CA-9EB5-A03CCC04776C}"/>
               </a:ext>
             </a:extLst>
           </p:cNvPr>
@@ -2676,7 +2676,7 @@
           <a:p>
             <a:fld id="{3E91D812-1C9C-49AD-BEC0-7CCA4CF1B6CD}" type="datetimeFigureOut">
               <a:rPr lang="pt-BR" smtClean="0"/>
-              <a:t>16/05/2019</a:t>
+              <a:t>17/05/2019</a:t>
             </a:fld>
             <a:endParaRPr lang="pt-BR"/>
           </a:p>
@@ -2687,7 +2687,7 @@
           <p:cNvPr id="6" name="Espaço Reservado para Rodapé 5">
             <a:extLst>
               <a:ext uri="{FF2B5EF4-FFF2-40B4-BE49-F238E27FC236}">
-                <a16:creationId xmlns:a16="http://schemas.microsoft.com/office/drawing/2014/main" xmlns="" id="{DE1A1C2D-E571-4A01-B309-5B33661B8B15}"/>
+                <a16:creationId xmlns:a16="http://schemas.microsoft.com/office/drawing/2014/main" id="{DE1A1C2D-E571-4A01-B309-5B33661B8B15}"/>
               </a:ext>
             </a:extLst>
           </p:cNvPr>
@@ -2712,7 +2712,7 @@
           <p:cNvPr id="7" name="Espaço Reservado para Número de Slide 6">
             <a:extLst>
               <a:ext uri="{FF2B5EF4-FFF2-40B4-BE49-F238E27FC236}">
-                <a16:creationId xmlns:a16="http://schemas.microsoft.com/office/drawing/2014/main" xmlns="" id="{08F653C0-8DD7-43C1-BEC6-1E93DB69F5B9}"/>
+                <a16:creationId xmlns:a16="http://schemas.microsoft.com/office/drawing/2014/main" id="{08F653C0-8DD7-43C1-BEC6-1E93DB69F5B9}"/>
               </a:ext>
             </a:extLst>
           </p:cNvPr>
@@ -2776,7 +2776,7 @@
           <p:cNvPr id="2" name="Espaço Reservado para Título 1">
             <a:extLst>
               <a:ext uri="{FF2B5EF4-FFF2-40B4-BE49-F238E27FC236}">
-                <a16:creationId xmlns:a16="http://schemas.microsoft.com/office/drawing/2014/main" xmlns="" id="{B723CC3C-D42A-4FE4-B09C-1BF909783445}"/>
+                <a16:creationId xmlns:a16="http://schemas.microsoft.com/office/drawing/2014/main" id="{B723CC3C-D42A-4FE4-B09C-1BF909783445}"/>
               </a:ext>
             </a:extLst>
           </p:cNvPr>
@@ -2814,7 +2814,7 @@
           <p:cNvPr id="3" name="Espaço Reservado para Texto 2">
             <a:extLst>
               <a:ext uri="{FF2B5EF4-FFF2-40B4-BE49-F238E27FC236}">
-                <a16:creationId xmlns:a16="http://schemas.microsoft.com/office/drawing/2014/main" xmlns="" id="{2BD6F6AE-CF78-4AE8-8CF8-EBFE2DB3B111}"/>
+                <a16:creationId xmlns:a16="http://schemas.microsoft.com/office/drawing/2014/main" id="{2BD6F6AE-CF78-4AE8-8CF8-EBFE2DB3B111}"/>
               </a:ext>
             </a:extLst>
           </p:cNvPr>
@@ -2881,7 +2881,7 @@
           <p:cNvPr id="4" name="Espaço Reservado para Data 3">
             <a:extLst>
               <a:ext uri="{FF2B5EF4-FFF2-40B4-BE49-F238E27FC236}">
-                <a16:creationId xmlns:a16="http://schemas.microsoft.com/office/drawing/2014/main" xmlns="" id="{D8346109-BE5F-41F4-B42C-6F0F6D77301A}"/>
+                <a16:creationId xmlns:a16="http://schemas.microsoft.com/office/drawing/2014/main" id="{D8346109-BE5F-41F4-B42C-6F0F6D77301A}"/>
               </a:ext>
             </a:extLst>
           </p:cNvPr>
@@ -2917,7 +2917,7 @@
           <a:p>
             <a:fld id="{3E91D812-1C9C-49AD-BEC0-7CCA4CF1B6CD}" type="datetimeFigureOut">
               <a:rPr lang="pt-BR" smtClean="0"/>
-              <a:t>16/05/2019</a:t>
+              <a:t>17/05/2019</a:t>
             </a:fld>
             <a:endParaRPr lang="pt-BR"/>
           </a:p>
@@ -2928,7 +2928,7 @@
           <p:cNvPr id="5" name="Espaço Reservado para Rodapé 4">
             <a:extLst>
               <a:ext uri="{FF2B5EF4-FFF2-40B4-BE49-F238E27FC236}">
-                <a16:creationId xmlns:a16="http://schemas.microsoft.com/office/drawing/2014/main" xmlns="" id="{CD3C5ACE-85F6-4C7A-8EA1-EDA7AAF6C284}"/>
+                <a16:creationId xmlns:a16="http://schemas.microsoft.com/office/drawing/2014/main" id="{CD3C5ACE-85F6-4C7A-8EA1-EDA7AAF6C284}"/>
               </a:ext>
             </a:extLst>
           </p:cNvPr>
@@ -2971,7 +2971,7 @@
           <p:cNvPr id="6" name="Espaço Reservado para Número de Slide 5">
             <a:extLst>
               <a:ext uri="{FF2B5EF4-FFF2-40B4-BE49-F238E27FC236}">
-                <a16:creationId xmlns:a16="http://schemas.microsoft.com/office/drawing/2014/main" xmlns="" id="{C8B16C26-275E-40C9-AF52-5C46E4F94B72}"/>
+                <a16:creationId xmlns:a16="http://schemas.microsoft.com/office/drawing/2014/main" id="{C8B16C26-275E-40C9-AF52-5C46E4F94B72}"/>
               </a:ext>
             </a:extLst>
           </p:cNvPr>
@@ -3412,10 +3412,9 @@
           <a:lstStyle/>
           <a:p>
             <a:r>
-              <a:rPr lang="pt-BR" sz="4400" b="1" dirty="0" smtClean="0"/>
+              <a:rPr lang="pt-BR" sz="4400" b="1" dirty="0"/>
               <a:t>ADS 3B</a:t>
             </a:r>
-            <a:endParaRPr lang="pt-BR" sz="4400" b="1" dirty="0"/>
           </a:p>
         </p:txBody>
       </p:sp>
@@ -3454,7 +3453,7 @@
           <p:cNvPr id="5" name="Título 1">
             <a:extLst>
               <a:ext uri="{FF2B5EF4-FFF2-40B4-BE49-F238E27FC236}">
-                <a16:creationId xmlns:a16="http://schemas.microsoft.com/office/drawing/2014/main" xmlns="" id="{68D3818B-3607-48B5-996D-457DBB256B86}"/>
+                <a16:creationId xmlns:a16="http://schemas.microsoft.com/office/drawing/2014/main" id="{68D3818B-3607-48B5-996D-457DBB256B86}"/>
               </a:ext>
             </a:extLst>
           </p:cNvPr>
@@ -3600,7 +3599,7 @@
           <p:cNvPr id="9" name="Título 1">
             <a:extLst>
               <a:ext uri="{FF2B5EF4-FFF2-40B4-BE49-F238E27FC236}">
-                <a16:creationId xmlns:a16="http://schemas.microsoft.com/office/drawing/2014/main" xmlns="" id="{77CE2ED0-3A26-43BD-8017-2D08C9C12598}"/>
+                <a16:creationId xmlns:a16="http://schemas.microsoft.com/office/drawing/2014/main" id="{77CE2ED0-3A26-43BD-8017-2D08C9C12598}"/>
               </a:ext>
             </a:extLst>
           </p:cNvPr>
@@ -3651,7 +3650,7 @@
           <p:cNvPr id="10" name="CaixaDeTexto 9">
             <a:extLst>
               <a:ext uri="{FF2B5EF4-FFF2-40B4-BE49-F238E27FC236}">
-                <a16:creationId xmlns:a16="http://schemas.microsoft.com/office/drawing/2014/main" xmlns="" id="{9027796C-0961-46D1-8725-3389D2548B9E}"/>
+                <a16:creationId xmlns:a16="http://schemas.microsoft.com/office/drawing/2014/main" id="{9027796C-0961-46D1-8725-3389D2548B9E}"/>
               </a:ext>
             </a:extLst>
           </p:cNvPr>
@@ -3677,10 +3676,9 @@
           <a:lstStyle/>
           <a:p>
             <a:r>
-              <a:rPr lang="pt-BR" b="1" dirty="0" smtClean="0"/>
+              <a:rPr lang="pt-BR" b="1" dirty="0"/>
               <a:t>Informar valor total</a:t>
             </a:r>
-            <a:endParaRPr lang="pt-BR" b="1" dirty="0"/>
           </a:p>
           <a:p>
             <a:r>
@@ -3688,10 +3686,9 @@
               <a:t>Evento: </a:t>
             </a:r>
             <a:r>
-              <a:rPr lang="pt-BR" dirty="0" smtClean="0"/>
+              <a:rPr lang="pt-BR" dirty="0"/>
               <a:t>Vendedor informa valor total</a:t>
             </a:r>
-            <a:endParaRPr lang="pt-BR" dirty="0"/>
           </a:p>
           <a:p>
             <a:r>
@@ -3699,7 +3696,7 @@
               <a:t>Objetivo:  </a:t>
             </a:r>
             <a:r>
-              <a:rPr lang="pt-BR" dirty="0" smtClean="0"/>
+              <a:rPr lang="pt-BR" dirty="0"/>
               <a:t>Informar o valor total ao Cliente</a:t>
             </a:r>
             <a:endParaRPr lang="pt-BR" b="1" dirty="0"/>
@@ -3710,10 +3707,9 @@
               <a:t>Trabalhadores Envolvidos: </a:t>
             </a:r>
             <a:r>
-              <a:rPr lang="pt-BR" dirty="0" smtClean="0"/>
+              <a:rPr lang="pt-BR" dirty="0"/>
               <a:t>Vendedor e Cliente</a:t>
             </a:r>
-            <a:endParaRPr lang="pt-BR" dirty="0"/>
           </a:p>
         </p:txBody>
       </p:sp>
@@ -3722,7 +3718,7 @@
           <p:cNvPr id="11" name="CaixaDeTexto 10">
             <a:extLst>
               <a:ext uri="{FF2B5EF4-FFF2-40B4-BE49-F238E27FC236}">
-                <a16:creationId xmlns:a16="http://schemas.microsoft.com/office/drawing/2014/main" xmlns="" id="{282A129C-45E2-42BD-ABC7-4E156E9B89CA}"/>
+                <a16:creationId xmlns:a16="http://schemas.microsoft.com/office/drawing/2014/main" id="{282A129C-45E2-42BD-ABC7-4E156E9B89CA}"/>
               </a:ext>
             </a:extLst>
           </p:cNvPr>
@@ -3751,13 +3747,8 @@
             </a:pPr>
             <a:r>
               <a:rPr lang="pt-BR" dirty="0"/>
-              <a:t>Vendedor </a:t>
-            </a:r>
-            <a:r>
-              <a:rPr lang="pt-BR" dirty="0" smtClean="0"/>
-              <a:t>verifica o pedido do Cliente em Pedido</a:t>
-            </a:r>
-            <a:endParaRPr lang="pt-BR" dirty="0"/>
+              <a:t>Vendedor verifica o pedido do Cliente em Pedido</a:t>
+            </a:r>
           </a:p>
           <a:p>
             <a:pPr marL="285750" indent="-285750">
@@ -3765,10 +3756,9 @@
               <a:buChar char="•"/>
             </a:pPr>
             <a:r>
-              <a:rPr lang="pt-BR" dirty="0" smtClean="0"/>
+              <a:rPr lang="pt-BR" dirty="0"/>
               <a:t>Vendedor verifica a venda em Venda</a:t>
             </a:r>
-            <a:endParaRPr lang="pt-BR" dirty="0"/>
           </a:p>
           <a:p>
             <a:pPr marL="285750" indent="-285750">
@@ -3776,14 +3766,9 @@
               <a:buChar char="•"/>
             </a:pPr>
             <a:r>
-              <a:rPr lang="pt-BR" dirty="0" smtClean="0"/>
-              <a:t>Vendedor inform</a:t>
-            </a:r>
-            <a:r>
-              <a:rPr lang="pt-BR" dirty="0" smtClean="0"/>
-              <a:t>a o valor total para o Cliente</a:t>
-            </a:r>
-            <a:endParaRPr lang="pt-BR" dirty="0"/>
+              <a:rPr lang="pt-BR" dirty="0"/>
+              <a:t>Vendedor informa o valor total para o Cliente</a:t>
+            </a:r>
           </a:p>
           <a:p>
             <a:pPr marL="285750" indent="-285750">
@@ -3799,7 +3784,7 @@
           <p:cNvPr id="12" name="Título 1">
             <a:extLst>
               <a:ext uri="{FF2B5EF4-FFF2-40B4-BE49-F238E27FC236}">
-                <a16:creationId xmlns:a16="http://schemas.microsoft.com/office/drawing/2014/main" xmlns="" id="{77CE2ED0-3A26-43BD-8017-2D08C9C12598}"/>
+                <a16:creationId xmlns:a16="http://schemas.microsoft.com/office/drawing/2014/main" id="{77CE2ED0-3A26-43BD-8017-2D08C9C12598}"/>
               </a:ext>
             </a:extLst>
           </p:cNvPr>
@@ -3842,20 +3827,20 @@
           </a:lstStyle>
           <a:p>
             <a:r>
-              <a:rPr lang="pt-BR" sz="2400" b="1" smtClean="0">
+              <a:rPr lang="pt-BR" sz="2400" b="1">
                 <a:latin typeface="Arial" panose="020B0604020202020204" pitchFamily="34" charset="0"/>
                 <a:cs typeface="Arial" panose="020B0604020202020204" pitchFamily="34" charset="0"/>
               </a:rPr>
               <a:t>Descrição dos</a:t>
             </a:r>
             <a:br>
-              <a:rPr lang="pt-BR" sz="2400" b="1" smtClean="0">
+              <a:rPr lang="pt-BR" sz="2400" b="1">
                 <a:latin typeface="Arial" panose="020B0604020202020204" pitchFamily="34" charset="0"/>
                 <a:cs typeface="Arial" panose="020B0604020202020204" pitchFamily="34" charset="0"/>
               </a:rPr>
             </a:br>
             <a:r>
-              <a:rPr lang="pt-BR" sz="2400" b="1" smtClean="0">
+              <a:rPr lang="pt-BR" sz="2400" b="1">
                 <a:latin typeface="Arial" panose="020B0604020202020204" pitchFamily="34" charset="0"/>
                 <a:cs typeface="Arial" panose="020B0604020202020204" pitchFamily="34" charset="0"/>
               </a:rPr>
@@ -3873,7 +3858,7 @@
           <p:cNvPr id="13" name="CaixaDeTexto 12">
             <a:extLst>
               <a:ext uri="{FF2B5EF4-FFF2-40B4-BE49-F238E27FC236}">
-                <a16:creationId xmlns:a16="http://schemas.microsoft.com/office/drawing/2014/main" xmlns="" id="{9027796C-0961-46D1-8725-3389D2548B9E}"/>
+                <a16:creationId xmlns:a16="http://schemas.microsoft.com/office/drawing/2014/main" id="{9027796C-0961-46D1-8725-3389D2548B9E}"/>
               </a:ext>
             </a:extLst>
           </p:cNvPr>
@@ -3899,10 +3884,9 @@
           <a:lstStyle/>
           <a:p>
             <a:r>
-              <a:rPr lang="pt-BR" b="1" dirty="0" smtClean="0"/>
+              <a:rPr lang="pt-BR" b="1" dirty="0"/>
               <a:t>Efetuar pagamento</a:t>
             </a:r>
-            <a:endParaRPr lang="pt-BR" b="1" dirty="0"/>
           </a:p>
           <a:p>
             <a:r>
@@ -3911,13 +3895,8 @@
             </a:r>
             <a:r>
               <a:rPr lang="pt-BR" dirty="0"/>
-              <a:t>Cliente </a:t>
-            </a:r>
-            <a:r>
-              <a:rPr lang="pt-BR" dirty="0" smtClean="0"/>
-              <a:t>efetua pagamento</a:t>
-            </a:r>
-            <a:endParaRPr lang="pt-BR" dirty="0"/>
+              <a:t>Cliente efetua pagamento</a:t>
+            </a:r>
           </a:p>
           <a:p>
             <a:r>
@@ -3925,7 +3904,7 @@
               <a:t>Objetivo:  </a:t>
             </a:r>
             <a:r>
-              <a:rPr lang="pt-BR" dirty="0" smtClean="0"/>
+              <a:rPr lang="pt-BR" dirty="0"/>
               <a:t>Cliente efetuar o pagamento de seu pedido</a:t>
             </a:r>
             <a:endParaRPr lang="pt-BR" b="1" dirty="0"/>
@@ -3936,10 +3915,9 @@
               <a:t>Trabalhadores Envolvidos: </a:t>
             </a:r>
             <a:r>
-              <a:rPr lang="pt-BR" dirty="0" smtClean="0"/>
+              <a:rPr lang="pt-BR" dirty="0"/>
               <a:t>Vendedor e Cliente</a:t>
             </a:r>
-            <a:endParaRPr lang="pt-BR" dirty="0"/>
           </a:p>
         </p:txBody>
       </p:sp>
@@ -3948,7 +3926,7 @@
           <p:cNvPr id="14" name="CaixaDeTexto 13">
             <a:extLst>
               <a:ext uri="{FF2B5EF4-FFF2-40B4-BE49-F238E27FC236}">
-                <a16:creationId xmlns:a16="http://schemas.microsoft.com/office/drawing/2014/main" xmlns="" id="{282A129C-45E2-42BD-ABC7-4E156E9B89CA}"/>
+                <a16:creationId xmlns:a16="http://schemas.microsoft.com/office/drawing/2014/main" id="{282A129C-45E2-42BD-ABC7-4E156E9B89CA}"/>
               </a:ext>
             </a:extLst>
           </p:cNvPr>
@@ -3977,13 +3955,8 @@
             </a:pPr>
             <a:r>
               <a:rPr lang="pt-BR" dirty="0"/>
-              <a:t>Vendedor </a:t>
-            </a:r>
-            <a:r>
-              <a:rPr lang="pt-BR" dirty="0" smtClean="0"/>
-              <a:t>consulta a venda em Venda.</a:t>
-            </a:r>
-            <a:endParaRPr lang="pt-BR" dirty="0"/>
+              <a:t>Vendedor consulta a venda em Venda.</a:t>
+            </a:r>
           </a:p>
           <a:p>
             <a:pPr marL="285750" indent="-285750">
@@ -3991,17 +3964,16 @@
               <a:buChar char="•"/>
             </a:pPr>
             <a:r>
-              <a:rPr lang="pt-BR" dirty="0" smtClean="0"/>
+              <a:rPr lang="pt-BR" dirty="0"/>
               <a:t>Vendedor verifica pedido em Pedido</a:t>
             </a:r>
             <a:br>
-              <a:rPr lang="pt-BR" dirty="0" smtClean="0"/>
+              <a:rPr lang="pt-BR" dirty="0"/>
             </a:br>
             <a:r>
-              <a:rPr lang="pt-BR" dirty="0" smtClean="0"/>
+              <a:rPr lang="pt-BR" dirty="0"/>
               <a:t>Vendedor altera Pedido.</a:t>
             </a:r>
-            <a:endParaRPr lang="pt-BR" dirty="0"/>
           </a:p>
         </p:txBody>
       </p:sp>
@@ -4040,7 +4012,7 @@
           <p:cNvPr id="3" name="Título 1">
             <a:extLst>
               <a:ext uri="{FF2B5EF4-FFF2-40B4-BE49-F238E27FC236}">
-                <a16:creationId xmlns:a16="http://schemas.microsoft.com/office/drawing/2014/main" xmlns="" id="{77CE2ED0-3A26-43BD-8017-2D08C9C12598}"/>
+                <a16:creationId xmlns:a16="http://schemas.microsoft.com/office/drawing/2014/main" id="{77CE2ED0-3A26-43BD-8017-2D08C9C12598}"/>
               </a:ext>
             </a:extLst>
           </p:cNvPr>
@@ -4091,7 +4063,7 @@
           <p:cNvPr id="5" name="CaixaDeTexto 4">
             <a:extLst>
               <a:ext uri="{FF2B5EF4-FFF2-40B4-BE49-F238E27FC236}">
-                <a16:creationId xmlns:a16="http://schemas.microsoft.com/office/drawing/2014/main" xmlns="" id="{282A129C-45E2-42BD-ABC7-4E156E9B89CA}"/>
+                <a16:creationId xmlns:a16="http://schemas.microsoft.com/office/drawing/2014/main" id="{282A129C-45E2-42BD-ABC7-4E156E9B89CA}"/>
               </a:ext>
             </a:extLst>
           </p:cNvPr>
@@ -4160,11 +4132,7 @@
             </a:pPr>
             <a:r>
               <a:rPr lang="pt-BR" dirty="0"/>
-              <a:t>Vendedor registra pagamento em </a:t>
-            </a:r>
-            <a:r>
-              <a:rPr lang="pt-BR" dirty="0" smtClean="0"/>
-              <a:t>Venda.</a:t>
+              <a:t>Vendedor registra pagamento em Venda.</a:t>
             </a:r>
           </a:p>
           <a:p>
@@ -4173,10 +4141,9 @@
               <a:buChar char="•"/>
             </a:pPr>
             <a:r>
-              <a:rPr lang="pt-BR" dirty="0" smtClean="0"/>
+              <a:rPr lang="pt-BR" dirty="0"/>
               <a:t>Vendedor armazena compra em Pedido</a:t>
             </a:r>
-            <a:endParaRPr lang="pt-BR" dirty="0"/>
           </a:p>
           <a:p>
             <a:pPr marL="285750" indent="-285750">
@@ -4184,10 +4151,9 @@
               <a:buChar char="•"/>
             </a:pPr>
             <a:r>
-              <a:rPr lang="pt-BR" dirty="0" smtClean="0"/>
+              <a:rPr lang="pt-BR" dirty="0"/>
               <a:t>Vendedor da baixa no estoque</a:t>
             </a:r>
-            <a:endParaRPr lang="pt-BR" dirty="0"/>
           </a:p>
           <a:p>
             <a:pPr marL="285750" indent="-285750">
@@ -4298,7 +4264,7 @@
           <p:cNvPr id="183" name="CaixaDeTexto 182">
             <a:extLst>
               <a:ext uri="{FF2B5EF4-FFF2-40B4-BE49-F238E27FC236}">
-                <a16:creationId xmlns:a16="http://schemas.microsoft.com/office/drawing/2014/main" xmlns="" id="{456A8FEB-B6F7-41CD-8E1F-9192EA17CB4C}"/>
+                <a16:creationId xmlns:a16="http://schemas.microsoft.com/office/drawing/2014/main" id="{456A8FEB-B6F7-41CD-8E1F-9192EA17CB4C}"/>
               </a:ext>
             </a:extLst>
           </p:cNvPr>
@@ -4322,18 +4288,28 @@
           <a:lstStyle/>
           <a:p>
             <a:r>
-              <a:rPr lang="pt-BR" sz="2400" b="1" dirty="0">
+              <a:rPr lang="pt-BR" sz="2400" b="1">
                 <a:latin typeface="Arial" panose="020B0604020202020204" pitchFamily="34" charset="0"/>
                 <a:cs typeface="Arial" panose="020B0604020202020204" pitchFamily="34" charset="0"/>
               </a:rPr>
               <a:t>Modelo Conceitual</a:t>
             </a:r>
+            <a:endParaRPr lang="pt-BR" sz="2400" b="1" dirty="0">
+              <a:latin typeface="Arial" panose="020B0604020202020204" pitchFamily="34" charset="0"/>
+              <a:cs typeface="Arial" panose="020B0604020202020204" pitchFamily="34" charset="0"/>
+            </a:endParaRPr>
           </a:p>
         </p:txBody>
       </p:sp>
       <p:pic>
         <p:nvPicPr>
-          <p:cNvPr id="2" name="Imagem 1"/>
+          <p:cNvPr id="4" name="Imagem 3">
+            <a:extLst>
+              <a:ext uri="{FF2B5EF4-FFF2-40B4-BE49-F238E27FC236}">
+                <a16:creationId xmlns:a16="http://schemas.microsoft.com/office/drawing/2014/main" id="{A4B7CFB3-88BC-4F54-9480-35DC790B9DA1}"/>
+              </a:ext>
+            </a:extLst>
+          </p:cNvPr>
           <p:cNvPicPr>
             <a:picLocks noChangeAspect="1"/>
           </p:cNvPicPr>
@@ -4347,8 +4323,8 @@
         </p:blipFill>
         <p:spPr>
           <a:xfrm>
-            <a:off x="2138678" y="1623033"/>
-            <a:ext cx="7200845" cy="3349799"/>
+            <a:off x="2727758" y="1376666"/>
+            <a:ext cx="6736483" cy="4104667"/>
           </a:xfrm>
           <a:prstGeom prst="rect">
             <a:avLst/>
@@ -4496,14 +4472,14 @@
                 <a:gridCol w="4064000">
                   <a:extLst>
                     <a:ext uri="{9D8B030D-6E8A-4147-A177-3AD203B41FA5}">
-                      <a16:colId xmlns:a16="http://schemas.microsoft.com/office/drawing/2014/main" xmlns="" val="20000"/>
+                      <a16:colId xmlns:a16="http://schemas.microsoft.com/office/drawing/2014/main" val="20000"/>
                     </a:ext>
                   </a:extLst>
                 </a:gridCol>
                 <a:gridCol w="4064000">
                   <a:extLst>
                     <a:ext uri="{9D8B030D-6E8A-4147-A177-3AD203B41FA5}">
-                      <a16:colId xmlns:a16="http://schemas.microsoft.com/office/drawing/2014/main" xmlns="" val="20001"/>
+                      <a16:colId xmlns:a16="http://schemas.microsoft.com/office/drawing/2014/main" val="20001"/>
                     </a:ext>
                   </a:extLst>
                 </a:gridCol>
@@ -4540,7 +4516,7 @@
                 </a:tc>
                 <a:extLst>
                   <a:ext uri="{0D108BD9-81ED-4DB2-BD59-A6C34878D82A}">
-                    <a16:rowId xmlns:a16="http://schemas.microsoft.com/office/drawing/2014/main" xmlns="" val="10000"/>
+                    <a16:rowId xmlns:a16="http://schemas.microsoft.com/office/drawing/2014/main" val="10000"/>
                   </a:ext>
                 </a:extLst>
               </a:tr>
@@ -4579,7 +4555,7 @@
                 </a:tc>
                 <a:extLst>
                   <a:ext uri="{0D108BD9-81ED-4DB2-BD59-A6C34878D82A}">
-                    <a16:rowId xmlns:a16="http://schemas.microsoft.com/office/drawing/2014/main" xmlns="" val="10001"/>
+                    <a16:rowId xmlns:a16="http://schemas.microsoft.com/office/drawing/2014/main" val="10001"/>
                   </a:ext>
                 </a:extLst>
               </a:tr>
@@ -4618,7 +4594,7 @@
                 </a:tc>
                 <a:extLst>
                   <a:ext uri="{0D108BD9-81ED-4DB2-BD59-A6C34878D82A}">
-                    <a16:rowId xmlns:a16="http://schemas.microsoft.com/office/drawing/2014/main" xmlns="" val="10002"/>
+                    <a16:rowId xmlns:a16="http://schemas.microsoft.com/office/drawing/2014/main" val="10002"/>
                   </a:ext>
                 </a:extLst>
               </a:tr>
@@ -4684,14 +4660,14 @@
                 <a:gridCol w="4064000">
                   <a:extLst>
                     <a:ext uri="{9D8B030D-6E8A-4147-A177-3AD203B41FA5}">
-                      <a16:colId xmlns:a16="http://schemas.microsoft.com/office/drawing/2014/main" xmlns="" val="20000"/>
+                      <a16:colId xmlns:a16="http://schemas.microsoft.com/office/drawing/2014/main" val="20000"/>
                     </a:ext>
                   </a:extLst>
                 </a:gridCol>
                 <a:gridCol w="4064000">
                   <a:extLst>
                     <a:ext uri="{9D8B030D-6E8A-4147-A177-3AD203B41FA5}">
-                      <a16:colId xmlns:a16="http://schemas.microsoft.com/office/drawing/2014/main" xmlns="" val="20001"/>
+                      <a16:colId xmlns:a16="http://schemas.microsoft.com/office/drawing/2014/main" val="20001"/>
                     </a:ext>
                   </a:extLst>
                 </a:gridCol>
@@ -4727,7 +4703,7 @@
                 </a:tc>
                 <a:extLst>
                   <a:ext uri="{0D108BD9-81ED-4DB2-BD59-A6C34878D82A}">
-                    <a16:rowId xmlns:a16="http://schemas.microsoft.com/office/drawing/2014/main" xmlns="" val="10000"/>
+                    <a16:rowId xmlns:a16="http://schemas.microsoft.com/office/drawing/2014/main" val="10000"/>
                   </a:ext>
                 </a:extLst>
               </a:tr>
@@ -4762,7 +4738,7 @@
                 </a:tc>
                 <a:extLst>
                   <a:ext uri="{0D108BD9-81ED-4DB2-BD59-A6C34878D82A}">
-                    <a16:rowId xmlns:a16="http://schemas.microsoft.com/office/drawing/2014/main" xmlns="" val="10001"/>
+                    <a16:rowId xmlns:a16="http://schemas.microsoft.com/office/drawing/2014/main" val="10001"/>
                   </a:ext>
                 </a:extLst>
               </a:tr>
@@ -4797,7 +4773,7 @@
                 </a:tc>
                 <a:extLst>
                   <a:ext uri="{0D108BD9-81ED-4DB2-BD59-A6C34878D82A}">
-                    <a16:rowId xmlns:a16="http://schemas.microsoft.com/office/drawing/2014/main" xmlns="" val="10002"/>
+                    <a16:rowId xmlns:a16="http://schemas.microsoft.com/office/drawing/2014/main" val="10002"/>
                   </a:ext>
                 </a:extLst>
               </a:tr>

</xml_diff>

<commit_message>
alteracao ciclo de vida AC6
</commit_message>
<xml_diff>
--- a/ACS/AC5/LucasKurata_AC5.pptx
+++ b/ACS/AC5/LucasKurata_AC5.pptx
@@ -4373,22 +4373,34 @@
       </p:sp>
       <p:pic>
         <p:nvPicPr>
-          <p:cNvPr id="5" name="Imagem 4"/>
+          <p:cNvPr id="3" name="Imagem 2">
+            <a:extLst>
+              <a:ext uri="{FF2B5EF4-FFF2-40B4-BE49-F238E27FC236}">
+                <a16:creationId xmlns:a16="http://schemas.microsoft.com/office/drawing/2014/main" id="{8D72A578-C6D9-4AC4-8F25-B89516DC0E4B}"/>
+              </a:ext>
+            </a:extLst>
+          </p:cNvPr>
           <p:cNvPicPr>
             <a:picLocks noChangeAspect="1"/>
           </p:cNvPicPr>
           <p:nvPr/>
         </p:nvPicPr>
         <p:blipFill>
-          <a:blip r:embed="rId2"/>
+          <a:blip r:embed="rId2">
+            <a:extLst>
+              <a:ext uri="{28A0092B-C50C-407E-A947-70E740481C1C}">
+                <a14:useLocalDpi xmlns:a14="http://schemas.microsoft.com/office/drawing/2010/main" val="0"/>
+              </a:ext>
+            </a:extLst>
+          </a:blip>
           <a:stretch>
             <a:fillRect/>
           </a:stretch>
         </p:blipFill>
         <p:spPr>
           <a:xfrm>
-            <a:off x="2133600" y="649555"/>
-            <a:ext cx="10058400" cy="6208445"/>
+            <a:off x="3244207" y="275573"/>
+            <a:ext cx="8276311" cy="5930674"/>
           </a:xfrm>
           <a:prstGeom prst="rect">
             <a:avLst/>

</xml_diff>